<commit_message>
Added my 1st slide for reviewing
</commit_message>
<xml_diff>
--- a/DSN-QRL-GR2.pptx
+++ b/DSN-QRL-GR2.pptx
@@ -6,6 +6,7 @@
   </p:sldMasterIdLst>
   <p:sldIdLst>
     <p:sldId id="256" r:id="rId2"/>
+    <p:sldId id="257" r:id="rId3"/>
   </p:sldIdLst>
   <p:sldSz cx="12192000" cy="6858000"/>
   <p:notesSz cx="6858000" cy="9144000"/>
@@ -104,6 +105,11 @@
       </a:defRPr>
     </a:lvl9pPr>
   </p:defaultTextStyle>
+  <p:extLst>
+    <p:ext uri="{EFAFB233-063F-42B5-8137-9DF3F51BA10A}">
+      <p15:sldGuideLst xmlns:p15="http://schemas.microsoft.com/office/powerpoint/2012/main"/>
+    </p:ext>
+  </p:extLst>
 </p:presentation>
 </file>
 
@@ -238,7 +244,7 @@
           <a:p>
             <a:fld id="{1AA62091-D445-4616-BF72-A845EF00C139}" type="datetimeFigureOut">
               <a:rPr lang="en-GB" smtClean="0"/>
-              <a:t>07/05/2017</a:t>
+              <a:t>08/05/2017</a:t>
             </a:fld>
             <a:endParaRPr lang="en-GB"/>
           </a:p>
@@ -408,7 +414,7 @@
           <a:p>
             <a:fld id="{1AA62091-D445-4616-BF72-A845EF00C139}" type="datetimeFigureOut">
               <a:rPr lang="en-GB" smtClean="0"/>
-              <a:t>07/05/2017</a:t>
+              <a:t>08/05/2017</a:t>
             </a:fld>
             <a:endParaRPr lang="en-GB"/>
           </a:p>
@@ -588,7 +594,7 @@
           <a:p>
             <a:fld id="{1AA62091-D445-4616-BF72-A845EF00C139}" type="datetimeFigureOut">
               <a:rPr lang="en-GB" smtClean="0"/>
-              <a:t>07/05/2017</a:t>
+              <a:t>08/05/2017</a:t>
             </a:fld>
             <a:endParaRPr lang="en-GB"/>
           </a:p>
@@ -758,7 +764,7 @@
           <a:p>
             <a:fld id="{1AA62091-D445-4616-BF72-A845EF00C139}" type="datetimeFigureOut">
               <a:rPr lang="en-GB" smtClean="0"/>
-              <a:t>07/05/2017</a:t>
+              <a:t>08/05/2017</a:t>
             </a:fld>
             <a:endParaRPr lang="en-GB"/>
           </a:p>
@@ -1004,7 +1010,7 @@
           <a:p>
             <a:fld id="{1AA62091-D445-4616-BF72-A845EF00C139}" type="datetimeFigureOut">
               <a:rPr lang="en-GB" smtClean="0"/>
-              <a:t>07/05/2017</a:t>
+              <a:t>08/05/2017</a:t>
             </a:fld>
             <a:endParaRPr lang="en-GB"/>
           </a:p>
@@ -1236,7 +1242,7 @@
           <a:p>
             <a:fld id="{1AA62091-D445-4616-BF72-A845EF00C139}" type="datetimeFigureOut">
               <a:rPr lang="en-GB" smtClean="0"/>
-              <a:t>07/05/2017</a:t>
+              <a:t>08/05/2017</a:t>
             </a:fld>
             <a:endParaRPr lang="en-GB"/>
           </a:p>
@@ -1603,7 +1609,7 @@
           <a:p>
             <a:fld id="{1AA62091-D445-4616-BF72-A845EF00C139}" type="datetimeFigureOut">
               <a:rPr lang="en-GB" smtClean="0"/>
-              <a:t>07/05/2017</a:t>
+              <a:t>08/05/2017</a:t>
             </a:fld>
             <a:endParaRPr lang="en-GB"/>
           </a:p>
@@ -1721,7 +1727,7 @@
           <a:p>
             <a:fld id="{1AA62091-D445-4616-BF72-A845EF00C139}" type="datetimeFigureOut">
               <a:rPr lang="en-GB" smtClean="0"/>
-              <a:t>07/05/2017</a:t>
+              <a:t>08/05/2017</a:t>
             </a:fld>
             <a:endParaRPr lang="en-GB"/>
           </a:p>
@@ -1816,7 +1822,7 @@
           <a:p>
             <a:fld id="{1AA62091-D445-4616-BF72-A845EF00C139}" type="datetimeFigureOut">
               <a:rPr lang="en-GB" smtClean="0"/>
-              <a:t>07/05/2017</a:t>
+              <a:t>08/05/2017</a:t>
             </a:fld>
             <a:endParaRPr lang="en-GB"/>
           </a:p>
@@ -2093,7 +2099,7 @@
           <a:p>
             <a:fld id="{1AA62091-D445-4616-BF72-A845EF00C139}" type="datetimeFigureOut">
               <a:rPr lang="en-GB" smtClean="0"/>
-              <a:t>07/05/2017</a:t>
+              <a:t>08/05/2017</a:t>
             </a:fld>
             <a:endParaRPr lang="en-GB"/>
           </a:p>
@@ -2346,7 +2352,7 @@
           <a:p>
             <a:fld id="{1AA62091-D445-4616-BF72-A845EF00C139}" type="datetimeFigureOut">
               <a:rPr lang="en-GB" smtClean="0"/>
-              <a:t>07/05/2017</a:t>
+              <a:t>08/05/2017</a:t>
             </a:fld>
             <a:endParaRPr lang="en-GB"/>
           </a:p>
@@ -2559,7 +2565,7 @@
           <a:p>
             <a:fld id="{1AA62091-D445-4616-BF72-A845EF00C139}" type="datetimeFigureOut">
               <a:rPr lang="en-GB" smtClean="0"/>
-              <a:t>07/05/2017</a:t>
+              <a:t>08/05/2017</a:t>
             </a:fld>
             <a:endParaRPr lang="en-GB"/>
           </a:p>
@@ -2966,44 +2972,6 @@
       </p:grpSpPr>
       <p:sp>
         <p:nvSpPr>
-          <p:cNvPr id="2" name="Title 1"/>
-          <p:cNvSpPr>
-            <a:spLocks noGrp="1"/>
-          </p:cNvSpPr>
-          <p:nvPr>
-            <p:ph type="ctrTitle"/>
-          </p:nvPr>
-        </p:nvSpPr>
-        <p:spPr/>
-        <p:txBody>
-          <a:bodyPr/>
-          <a:lstStyle/>
-          <a:p>
-            <a:endParaRPr lang="en-GB" dirty="0"/>
-          </a:p>
-        </p:txBody>
-      </p:sp>
-      <p:sp>
-        <p:nvSpPr>
-          <p:cNvPr id="3" name="Subtitle 2"/>
-          <p:cNvSpPr>
-            <a:spLocks noGrp="1"/>
-          </p:cNvSpPr>
-          <p:nvPr>
-            <p:ph type="subTitle" idx="1"/>
-          </p:nvPr>
-        </p:nvSpPr>
-        <p:spPr/>
-        <p:txBody>
-          <a:bodyPr/>
-          <a:lstStyle/>
-          <a:p>
-            <a:endParaRPr lang="en-GB" dirty="0"/>
-          </a:p>
-        </p:txBody>
-      </p:sp>
-      <p:sp>
-        <p:nvSpPr>
           <p:cNvPr id="4" name="Title 1"/>
           <p:cNvSpPr txBox="1">
             <a:spLocks/>
@@ -3079,14 +3047,14 @@
                 <a:gridCol w="2232910">
                   <a:extLst>
                     <a:ext uri="{9D8B030D-6E8A-4147-A177-3AD203B41FA5}">
-                      <a16:colId xmlns:a16="http://schemas.microsoft.com/office/drawing/2014/main" xmlns="" val="2582641705"/>
+                      <a16:colId xmlns="" xmlns:a16="http://schemas.microsoft.com/office/drawing/2014/main" val="2582641705"/>
                     </a:ext>
                   </a:extLst>
                 </a:gridCol>
                 <a:gridCol w="3200481">
                   <a:extLst>
                     <a:ext uri="{9D8B030D-6E8A-4147-A177-3AD203B41FA5}">
-                      <a16:colId xmlns:a16="http://schemas.microsoft.com/office/drawing/2014/main" xmlns="" val="1931994600"/>
+                      <a16:colId xmlns="" xmlns:a16="http://schemas.microsoft.com/office/drawing/2014/main" val="1931994600"/>
                     </a:ext>
                   </a:extLst>
                 </a:gridCol>
@@ -3158,7 +3126,7 @@
                 </a:tc>
                 <a:extLst>
                   <a:ext uri="{0D108BD9-81ED-4DB2-BD59-A6C34878D82A}">
-                    <a16:rowId xmlns:a16="http://schemas.microsoft.com/office/drawing/2014/main" xmlns="" val="3811032526"/>
+                    <a16:rowId xmlns="" xmlns:a16="http://schemas.microsoft.com/office/drawing/2014/main" val="3811032526"/>
                   </a:ext>
                 </a:extLst>
               </a:tr>
@@ -3247,7 +3215,7 @@
                 </a:tc>
                 <a:extLst>
                   <a:ext uri="{0D108BD9-81ED-4DB2-BD59-A6C34878D82A}">
-                    <a16:rowId xmlns:a16="http://schemas.microsoft.com/office/drawing/2014/main" xmlns="" val="2839484681"/>
+                    <a16:rowId xmlns="" xmlns:a16="http://schemas.microsoft.com/office/drawing/2014/main" val="2839484681"/>
                   </a:ext>
                 </a:extLst>
               </a:tr>
@@ -3336,7 +3304,7 @@
                 </a:tc>
                 <a:extLst>
                   <a:ext uri="{0D108BD9-81ED-4DB2-BD59-A6C34878D82A}">
-                    <a16:rowId xmlns:a16="http://schemas.microsoft.com/office/drawing/2014/main" xmlns="" val="3842791150"/>
+                    <a16:rowId xmlns="" xmlns:a16="http://schemas.microsoft.com/office/drawing/2014/main" val="3842791150"/>
                   </a:ext>
                 </a:extLst>
               </a:tr>
@@ -3419,7 +3387,7 @@
                 </a:tc>
                 <a:extLst>
                   <a:ext uri="{0D108BD9-81ED-4DB2-BD59-A6C34878D82A}">
-                    <a16:rowId xmlns:a16="http://schemas.microsoft.com/office/drawing/2014/main" xmlns="" val="1501510031"/>
+                    <a16:rowId xmlns="" xmlns:a16="http://schemas.microsoft.com/office/drawing/2014/main" val="1501510031"/>
                   </a:ext>
                 </a:extLst>
               </a:tr>
@@ -3514,7 +3482,7 @@
                 </a:tc>
                 <a:extLst>
                   <a:ext uri="{0D108BD9-81ED-4DB2-BD59-A6C34878D82A}">
-                    <a16:rowId xmlns:a16="http://schemas.microsoft.com/office/drawing/2014/main" xmlns="" val="309591440"/>
+                    <a16:rowId xmlns="" xmlns:a16="http://schemas.microsoft.com/office/drawing/2014/main" val="309591440"/>
                   </a:ext>
                 </a:extLst>
               </a:tr>
@@ -3597,7 +3565,7 @@
                 </a:tc>
                 <a:extLst>
                   <a:ext uri="{0D108BD9-81ED-4DB2-BD59-A6C34878D82A}">
-                    <a16:rowId xmlns:a16="http://schemas.microsoft.com/office/drawing/2014/main" xmlns="" val="1374417764"/>
+                    <a16:rowId xmlns="" xmlns:a16="http://schemas.microsoft.com/office/drawing/2014/main" val="1374417764"/>
                   </a:ext>
                 </a:extLst>
               </a:tr>
@@ -3731,11 +3699,7 @@
             </a:r>
             <a:r>
               <a:rPr lang="en-US" b="1" dirty="0" smtClean="0"/>
-              <a:t>14</a:t>
-            </a:r>
-            <a:r>
-              <a:rPr lang="en-US" b="1" dirty="0" smtClean="0"/>
-              <a:t>-05-2017</a:t>
+              <a:t>14-05-2017</a:t>
             </a:r>
             <a:endParaRPr lang="en-US" dirty="0"/>
           </a:p>
@@ -3798,6 +3762,442 @@
         <p:cTn id="1" dur="indefinite" restart="never" nodeType="tmRoot"/>
       </p:par>
     </p:tnLst>
+  </p:timing>
+</p:sld>
+</file>
+
+<file path=ppt/slides/slide2.xml><?xml version="1.0" encoding="utf-8"?>
+<p:sld xmlns:a="http://schemas.openxmlformats.org/drawingml/2006/main" xmlns:r="http://schemas.openxmlformats.org/officeDocument/2006/relationships" xmlns:p="http://schemas.openxmlformats.org/presentationml/2006/main">
+  <p:cSld>
+    <p:spTree>
+      <p:nvGrpSpPr>
+        <p:cNvPr id="1" name=""/>
+        <p:cNvGrpSpPr/>
+        <p:nvPr/>
+      </p:nvGrpSpPr>
+      <p:grpSpPr>
+        <a:xfrm>
+          <a:off x="0" y="0"/>
+          <a:ext cx="0" cy="0"/>
+          <a:chOff x="0" y="0"/>
+          <a:chExt cx="0" cy="0"/>
+        </a:xfrm>
+      </p:grpSpPr>
+      <p:sp>
+        <p:nvSpPr>
+          <p:cNvPr id="2" name="Title 1"/>
+          <p:cNvSpPr>
+            <a:spLocks noGrp="1"/>
+          </p:cNvSpPr>
+          <p:nvPr>
+            <p:ph type="title"/>
+          </p:nvPr>
+        </p:nvSpPr>
+        <p:spPr>
+          <a:xfrm>
+            <a:off x="838200" y="558310"/>
+            <a:ext cx="10515600" cy="1325563"/>
+          </a:xfrm>
+        </p:spPr>
+        <p:txBody>
+          <a:bodyPr/>
+          <a:lstStyle/>
+          <a:p>
+            <a:pPr algn="ctr"/>
+            <a:r>
+              <a:rPr lang="en-GB" b="1" dirty="0"/>
+              <a:t>History of Twitter Reliability</a:t>
+            </a:r>
+            <a:r>
+              <a:rPr lang="en-GB" dirty="0"/>
+              <a:t/>
+            </a:r>
+            <a:br>
+              <a:rPr lang="en-GB" dirty="0"/>
+            </a:br>
+            <a:endParaRPr lang="en-GB" dirty="0"/>
+          </a:p>
+        </p:txBody>
+      </p:sp>
+      <p:sp>
+        <p:nvSpPr>
+          <p:cNvPr id="3" name="Content Placeholder 2"/>
+          <p:cNvSpPr>
+            <a:spLocks noGrp="1"/>
+          </p:cNvSpPr>
+          <p:nvPr>
+            <p:ph idx="1"/>
+          </p:nvPr>
+        </p:nvSpPr>
+        <p:spPr/>
+        <p:txBody>
+          <a:bodyPr/>
+          <a:lstStyle/>
+          <a:p>
+            <a:r>
+              <a:rPr lang="en-GB" dirty="0"/>
+              <a:t>created </a:t>
+            </a:r>
+            <a:r>
+              <a:rPr lang="en-GB" dirty="0" smtClean="0"/>
+              <a:t>the prototype first.</a:t>
+            </a:r>
+          </a:p>
+          <a:p>
+            <a:r>
+              <a:rPr lang="en-GB" dirty="0"/>
+              <a:t>internal service for Odeo </a:t>
+            </a:r>
+            <a:endParaRPr lang="en-GB" dirty="0" smtClean="0"/>
+          </a:p>
+          <a:p>
+            <a:pPr marL="0" indent="0">
+              <a:buNone/>
+            </a:pPr>
+            <a:r>
+              <a:rPr lang="en-GB" dirty="0"/>
+              <a:t> </a:t>
+            </a:r>
+            <a:r>
+              <a:rPr lang="en-GB" dirty="0" smtClean="0"/>
+              <a:t>  employees.</a:t>
+            </a:r>
+          </a:p>
+          <a:p>
+            <a:pPr marL="0" indent="0">
+              <a:buNone/>
+            </a:pPr>
+            <a:endParaRPr lang="en-GB" dirty="0" smtClean="0"/>
+          </a:p>
+          <a:p>
+            <a:endParaRPr lang="en-GB" dirty="0" smtClean="0"/>
+          </a:p>
+        </p:txBody>
+      </p:sp>
+      <p:sp>
+        <p:nvSpPr>
+          <p:cNvPr id="9" name="Rectangle 8"/>
+          <p:cNvSpPr/>
+          <p:nvPr/>
+        </p:nvSpPr>
+        <p:spPr>
+          <a:xfrm>
+            <a:off x="10016197" y="180459"/>
+            <a:ext cx="2003525" cy="369332"/>
+          </a:xfrm>
+          <a:prstGeom prst="rect">
+            <a:avLst/>
+          </a:prstGeom>
+          <a:ln>
+            <a:solidFill>
+              <a:schemeClr val="accent1"/>
+            </a:solidFill>
+          </a:ln>
+        </p:spPr>
+        <p:txBody>
+          <a:bodyPr wrap="square">
+            <a:spAutoFit/>
+          </a:bodyPr>
+          <a:lstStyle/>
+          <a:p>
+            <a:pPr algn="ctr"/>
+            <a:r>
+              <a:rPr lang="en-US" dirty="0" smtClean="0"/>
+              <a:t>IT14098888</a:t>
+            </a:r>
+            <a:endParaRPr lang="en-US" dirty="0"/>
+          </a:p>
+        </p:txBody>
+      </p:sp>
+      <p:pic>
+        <p:nvPicPr>
+          <p:cNvPr id="10" name="Picture 9"/>
+          <p:cNvPicPr/>
+          <p:nvPr/>
+        </p:nvPicPr>
+        <p:blipFill>
+          <a:blip r:embed="rId2">
+            <a:extLst>
+              <a:ext uri="{28A0092B-C50C-407E-A947-70E740481C1C}">
+                <a14:useLocalDpi xmlns:a14="http://schemas.microsoft.com/office/drawing/2010/main" val="0"/>
+              </a:ext>
+            </a:extLst>
+          </a:blip>
+          <a:stretch>
+            <a:fillRect/>
+          </a:stretch>
+        </p:blipFill>
+        <p:spPr>
+          <a:xfrm>
+            <a:off x="5286449" y="1947228"/>
+            <a:ext cx="5731510" cy="4229735"/>
+          </a:xfrm>
+          <a:prstGeom prst="rect">
+            <a:avLst/>
+          </a:prstGeom>
+        </p:spPr>
+      </p:pic>
+    </p:spTree>
+    <p:extLst>
+      <p:ext uri="{BB962C8B-B14F-4D97-AF65-F5344CB8AC3E}">
+        <p14:creationId xmlns:p14="http://schemas.microsoft.com/office/powerpoint/2010/main" val="2665032223"/>
+      </p:ext>
+    </p:extLst>
+  </p:cSld>
+  <p:clrMapOvr>
+    <a:masterClrMapping/>
+  </p:clrMapOvr>
+  <p:timing>
+    <p:tnLst>
+      <p:par>
+        <p:cTn id="1" dur="indefinite" restart="never" nodeType="tmRoot">
+          <p:childTnLst>
+            <p:seq concurrent="1" nextAc="seek">
+              <p:cTn id="2" dur="indefinite" nodeType="mainSeq">
+                <p:childTnLst>
+                  <p:par>
+                    <p:cTn id="3" fill="hold">
+                      <p:stCondLst>
+                        <p:cond delay="indefinite"/>
+                      </p:stCondLst>
+                      <p:childTnLst>
+                        <p:par>
+                          <p:cTn id="4" fill="hold">
+                            <p:stCondLst>
+                              <p:cond delay="0"/>
+                            </p:stCondLst>
+                            <p:childTnLst>
+                              <p:par>
+                                <p:cTn id="5" presetID="1" presetClass="entr" presetSubtype="0" fill="hold" grpId="0" nodeType="clickEffect">
+                                  <p:stCondLst>
+                                    <p:cond delay="0"/>
+                                  </p:stCondLst>
+                                  <p:childTnLst>
+                                    <p:set>
+                                      <p:cBhvr>
+                                        <p:cTn id="6" dur="1" fill="hold">
+                                          <p:stCondLst>
+                                            <p:cond delay="0"/>
+                                          </p:stCondLst>
+                                        </p:cTn>
+                                        <p:tgtEl>
+                                          <p:spTgt spid="2"/>
+                                        </p:tgtEl>
+                                        <p:attrNameLst>
+                                          <p:attrName>style.visibility</p:attrName>
+                                        </p:attrNameLst>
+                                      </p:cBhvr>
+                                      <p:to>
+                                        <p:strVal val="visible"/>
+                                      </p:to>
+                                    </p:set>
+                                  </p:childTnLst>
+                                </p:cTn>
+                              </p:par>
+                            </p:childTnLst>
+                          </p:cTn>
+                        </p:par>
+                      </p:childTnLst>
+                    </p:cTn>
+                  </p:par>
+                  <p:par>
+                    <p:cTn id="7" fill="hold">
+                      <p:stCondLst>
+                        <p:cond delay="indefinite"/>
+                      </p:stCondLst>
+                      <p:childTnLst>
+                        <p:par>
+                          <p:cTn id="8" fill="hold">
+                            <p:stCondLst>
+                              <p:cond delay="0"/>
+                            </p:stCondLst>
+                            <p:childTnLst>
+                              <p:par>
+                                <p:cTn id="9" presetID="1" presetClass="entr" presetSubtype="0" fill="hold" nodeType="clickEffect">
+                                  <p:stCondLst>
+                                    <p:cond delay="0"/>
+                                  </p:stCondLst>
+                                  <p:childTnLst>
+                                    <p:set>
+                                      <p:cBhvr>
+                                        <p:cTn id="10" dur="1" fill="hold">
+                                          <p:stCondLst>
+                                            <p:cond delay="0"/>
+                                          </p:stCondLst>
+                                        </p:cTn>
+                                        <p:tgtEl>
+                                          <p:spTgt spid="3">
+                                            <p:txEl>
+                                              <p:pRg st="0" end="0"/>
+                                            </p:txEl>
+                                          </p:spTgt>
+                                        </p:tgtEl>
+                                        <p:attrNameLst>
+                                          <p:attrName>style.visibility</p:attrName>
+                                        </p:attrNameLst>
+                                      </p:cBhvr>
+                                      <p:to>
+                                        <p:strVal val="visible"/>
+                                      </p:to>
+                                    </p:set>
+                                  </p:childTnLst>
+                                </p:cTn>
+                              </p:par>
+                            </p:childTnLst>
+                          </p:cTn>
+                        </p:par>
+                      </p:childTnLst>
+                    </p:cTn>
+                  </p:par>
+                  <p:par>
+                    <p:cTn id="11" fill="hold">
+                      <p:stCondLst>
+                        <p:cond delay="indefinite"/>
+                      </p:stCondLst>
+                      <p:childTnLst>
+                        <p:par>
+                          <p:cTn id="12" fill="hold">
+                            <p:stCondLst>
+                              <p:cond delay="0"/>
+                            </p:stCondLst>
+                            <p:childTnLst>
+                              <p:par>
+                                <p:cTn id="13" presetID="1" presetClass="entr" presetSubtype="0" fill="hold" nodeType="clickEffect">
+                                  <p:stCondLst>
+                                    <p:cond delay="0"/>
+                                  </p:stCondLst>
+                                  <p:childTnLst>
+                                    <p:set>
+                                      <p:cBhvr>
+                                        <p:cTn id="14" dur="1" fill="hold">
+                                          <p:stCondLst>
+                                            <p:cond delay="0"/>
+                                          </p:stCondLst>
+                                        </p:cTn>
+                                        <p:tgtEl>
+                                          <p:spTgt spid="10"/>
+                                        </p:tgtEl>
+                                        <p:attrNameLst>
+                                          <p:attrName>style.visibility</p:attrName>
+                                        </p:attrNameLst>
+                                      </p:cBhvr>
+                                      <p:to>
+                                        <p:strVal val="visible"/>
+                                      </p:to>
+                                    </p:set>
+                                  </p:childTnLst>
+                                </p:cTn>
+                              </p:par>
+                            </p:childTnLst>
+                          </p:cTn>
+                        </p:par>
+                      </p:childTnLst>
+                    </p:cTn>
+                  </p:par>
+                  <p:par>
+                    <p:cTn id="15" fill="hold">
+                      <p:stCondLst>
+                        <p:cond delay="indefinite"/>
+                      </p:stCondLst>
+                      <p:childTnLst>
+                        <p:par>
+                          <p:cTn id="16" fill="hold">
+                            <p:stCondLst>
+                              <p:cond delay="0"/>
+                            </p:stCondLst>
+                            <p:childTnLst>
+                              <p:par>
+                                <p:cTn id="17" presetID="1" presetClass="entr" presetSubtype="0" fill="hold" nodeType="clickEffect">
+                                  <p:stCondLst>
+                                    <p:cond delay="0"/>
+                                  </p:stCondLst>
+                                  <p:childTnLst>
+                                    <p:set>
+                                      <p:cBhvr>
+                                        <p:cTn id="18" dur="1" fill="hold">
+                                          <p:stCondLst>
+                                            <p:cond delay="0"/>
+                                          </p:stCondLst>
+                                        </p:cTn>
+                                        <p:tgtEl>
+                                          <p:spTgt spid="3">
+                                            <p:txEl>
+                                              <p:pRg st="1" end="1"/>
+                                            </p:txEl>
+                                          </p:spTgt>
+                                        </p:tgtEl>
+                                        <p:attrNameLst>
+                                          <p:attrName>style.visibility</p:attrName>
+                                        </p:attrNameLst>
+                                      </p:cBhvr>
+                                      <p:to>
+                                        <p:strVal val="visible"/>
+                                      </p:to>
+                                    </p:set>
+                                  </p:childTnLst>
+                                </p:cTn>
+                              </p:par>
+                              <p:par>
+                                <p:cTn id="19" presetID="1" presetClass="entr" presetSubtype="0" fill="hold" nodeType="withEffect">
+                                  <p:stCondLst>
+                                    <p:cond delay="0"/>
+                                  </p:stCondLst>
+                                  <p:childTnLst>
+                                    <p:set>
+                                      <p:cBhvr>
+                                        <p:cTn id="20" dur="1" fill="hold">
+                                          <p:stCondLst>
+                                            <p:cond delay="0"/>
+                                          </p:stCondLst>
+                                        </p:cTn>
+                                        <p:tgtEl>
+                                          <p:spTgt spid="3">
+                                            <p:txEl>
+                                              <p:pRg st="2" end="2"/>
+                                            </p:txEl>
+                                          </p:spTgt>
+                                        </p:tgtEl>
+                                        <p:attrNameLst>
+                                          <p:attrName>style.visibility</p:attrName>
+                                        </p:attrNameLst>
+                                      </p:cBhvr>
+                                      <p:to>
+                                        <p:strVal val="visible"/>
+                                      </p:to>
+                                    </p:set>
+                                  </p:childTnLst>
+                                </p:cTn>
+                              </p:par>
+                            </p:childTnLst>
+                          </p:cTn>
+                        </p:par>
+                      </p:childTnLst>
+                    </p:cTn>
+                  </p:par>
+                </p:childTnLst>
+              </p:cTn>
+              <p:prevCondLst>
+                <p:cond evt="onPrev" delay="0">
+                  <p:tgtEl>
+                    <p:sldTgt/>
+                  </p:tgtEl>
+                </p:cond>
+              </p:prevCondLst>
+              <p:nextCondLst>
+                <p:cond evt="onNext" delay="0">
+                  <p:tgtEl>
+                    <p:sldTgt/>
+                  </p:tgtEl>
+                </p:cond>
+              </p:nextCondLst>
+            </p:seq>
+          </p:childTnLst>
+        </p:cTn>
+      </p:par>
+    </p:tnLst>
+    <p:bldLst>
+      <p:bldP spid="2" grpId="0"/>
+    </p:bldLst>
   </p:timing>
 </p:sld>
 </file>

</xml_diff>

<commit_message>
Add ur presentation scripts here
</commit_message>
<xml_diff>
--- a/DSN-QRL-GR2.pptx
+++ b/DSN-QRL-GR2.pptx
@@ -8,6 +8,7 @@
     <p:sldId id="256" r:id="rId2"/>
     <p:sldId id="258" r:id="rId3"/>
     <p:sldId id="257" r:id="rId4"/>
+    <p:sldId id="259" r:id="rId5"/>
   </p:sldIdLst>
   <p:sldSz cx="12192000" cy="6858000"/>
   <p:notesSz cx="6858000" cy="9144000"/>
@@ -245,7 +246,7 @@
           <a:p>
             <a:fld id="{1AA62091-D445-4616-BF72-A845EF00C139}" type="datetimeFigureOut">
               <a:rPr lang="en-GB" smtClean="0"/>
-              <a:t>08/05/2017</a:t>
+              <a:t>09/05/2017</a:t>
             </a:fld>
             <a:endParaRPr lang="en-GB"/>
           </a:p>
@@ -415,7 +416,7 @@
           <a:p>
             <a:fld id="{1AA62091-D445-4616-BF72-A845EF00C139}" type="datetimeFigureOut">
               <a:rPr lang="en-GB" smtClean="0"/>
-              <a:t>08/05/2017</a:t>
+              <a:t>09/05/2017</a:t>
             </a:fld>
             <a:endParaRPr lang="en-GB"/>
           </a:p>
@@ -595,7 +596,7 @@
           <a:p>
             <a:fld id="{1AA62091-D445-4616-BF72-A845EF00C139}" type="datetimeFigureOut">
               <a:rPr lang="en-GB" smtClean="0"/>
-              <a:t>08/05/2017</a:t>
+              <a:t>09/05/2017</a:t>
             </a:fld>
             <a:endParaRPr lang="en-GB"/>
           </a:p>
@@ -765,7 +766,7 @@
           <a:p>
             <a:fld id="{1AA62091-D445-4616-BF72-A845EF00C139}" type="datetimeFigureOut">
               <a:rPr lang="en-GB" smtClean="0"/>
-              <a:t>08/05/2017</a:t>
+              <a:t>09/05/2017</a:t>
             </a:fld>
             <a:endParaRPr lang="en-GB"/>
           </a:p>
@@ -1011,7 +1012,7 @@
           <a:p>
             <a:fld id="{1AA62091-D445-4616-BF72-A845EF00C139}" type="datetimeFigureOut">
               <a:rPr lang="en-GB" smtClean="0"/>
-              <a:t>08/05/2017</a:t>
+              <a:t>09/05/2017</a:t>
             </a:fld>
             <a:endParaRPr lang="en-GB"/>
           </a:p>
@@ -1243,7 +1244,7 @@
           <a:p>
             <a:fld id="{1AA62091-D445-4616-BF72-A845EF00C139}" type="datetimeFigureOut">
               <a:rPr lang="en-GB" smtClean="0"/>
-              <a:t>08/05/2017</a:t>
+              <a:t>09/05/2017</a:t>
             </a:fld>
             <a:endParaRPr lang="en-GB"/>
           </a:p>
@@ -1610,7 +1611,7 @@
           <a:p>
             <a:fld id="{1AA62091-D445-4616-BF72-A845EF00C139}" type="datetimeFigureOut">
               <a:rPr lang="en-GB" smtClean="0"/>
-              <a:t>08/05/2017</a:t>
+              <a:t>09/05/2017</a:t>
             </a:fld>
             <a:endParaRPr lang="en-GB"/>
           </a:p>
@@ -1728,7 +1729,7 @@
           <a:p>
             <a:fld id="{1AA62091-D445-4616-BF72-A845EF00C139}" type="datetimeFigureOut">
               <a:rPr lang="en-GB" smtClean="0"/>
-              <a:t>08/05/2017</a:t>
+              <a:t>09/05/2017</a:t>
             </a:fld>
             <a:endParaRPr lang="en-GB"/>
           </a:p>
@@ -1823,7 +1824,7 @@
           <a:p>
             <a:fld id="{1AA62091-D445-4616-BF72-A845EF00C139}" type="datetimeFigureOut">
               <a:rPr lang="en-GB" smtClean="0"/>
-              <a:t>08/05/2017</a:t>
+              <a:t>09/05/2017</a:t>
             </a:fld>
             <a:endParaRPr lang="en-GB"/>
           </a:p>
@@ -2100,7 +2101,7 @@
           <a:p>
             <a:fld id="{1AA62091-D445-4616-BF72-A845EF00C139}" type="datetimeFigureOut">
               <a:rPr lang="en-GB" smtClean="0"/>
-              <a:t>08/05/2017</a:t>
+              <a:t>09/05/2017</a:t>
             </a:fld>
             <a:endParaRPr lang="en-GB"/>
           </a:p>
@@ -2353,7 +2354,7 @@
           <a:p>
             <a:fld id="{1AA62091-D445-4616-BF72-A845EF00C139}" type="datetimeFigureOut">
               <a:rPr lang="en-GB" smtClean="0"/>
-              <a:t>08/05/2017</a:t>
+              <a:t>09/05/2017</a:t>
             </a:fld>
             <a:endParaRPr lang="en-GB"/>
           </a:p>
@@ -2566,7 +2567,7 @@
           <a:p>
             <a:fld id="{1AA62091-D445-4616-BF72-A845EF00C139}" type="datetimeFigureOut">
               <a:rPr lang="en-GB" smtClean="0"/>
-              <a:t>08/05/2017</a:t>
+              <a:t>09/05/2017</a:t>
             </a:fld>
             <a:endParaRPr lang="en-GB"/>
           </a:p>
@@ -3048,14 +3049,14 @@
                 <a:gridCol w="2232910">
                   <a:extLst>
                     <a:ext uri="{9D8B030D-6E8A-4147-A177-3AD203B41FA5}">
-                      <a16:colId xmlns:a16="http://schemas.microsoft.com/office/drawing/2014/main" xmlns="" val="2582641705"/>
+                      <a16:colId xmlns="" xmlns:a16="http://schemas.microsoft.com/office/drawing/2014/main" val="2582641705"/>
                     </a:ext>
                   </a:extLst>
                 </a:gridCol>
                 <a:gridCol w="3200481">
                   <a:extLst>
                     <a:ext uri="{9D8B030D-6E8A-4147-A177-3AD203B41FA5}">
-                      <a16:colId xmlns:a16="http://schemas.microsoft.com/office/drawing/2014/main" xmlns="" val="1931994600"/>
+                      <a16:colId xmlns="" xmlns:a16="http://schemas.microsoft.com/office/drawing/2014/main" val="1931994600"/>
                     </a:ext>
                   </a:extLst>
                 </a:gridCol>
@@ -3127,7 +3128,7 @@
                 </a:tc>
                 <a:extLst>
                   <a:ext uri="{0D108BD9-81ED-4DB2-BD59-A6C34878D82A}">
-                    <a16:rowId xmlns:a16="http://schemas.microsoft.com/office/drawing/2014/main" xmlns="" val="3811032526"/>
+                    <a16:rowId xmlns="" xmlns:a16="http://schemas.microsoft.com/office/drawing/2014/main" val="3811032526"/>
                   </a:ext>
                 </a:extLst>
               </a:tr>
@@ -3216,7 +3217,7 @@
                 </a:tc>
                 <a:extLst>
                   <a:ext uri="{0D108BD9-81ED-4DB2-BD59-A6C34878D82A}">
-                    <a16:rowId xmlns:a16="http://schemas.microsoft.com/office/drawing/2014/main" xmlns="" val="2839484681"/>
+                    <a16:rowId xmlns="" xmlns:a16="http://schemas.microsoft.com/office/drawing/2014/main" val="2839484681"/>
                   </a:ext>
                 </a:extLst>
               </a:tr>
@@ -3305,7 +3306,7 @@
                 </a:tc>
                 <a:extLst>
                   <a:ext uri="{0D108BD9-81ED-4DB2-BD59-A6C34878D82A}">
-                    <a16:rowId xmlns:a16="http://schemas.microsoft.com/office/drawing/2014/main" xmlns="" val="3842791150"/>
+                    <a16:rowId xmlns="" xmlns:a16="http://schemas.microsoft.com/office/drawing/2014/main" val="3842791150"/>
                   </a:ext>
                 </a:extLst>
               </a:tr>
@@ -3388,7 +3389,7 @@
                 </a:tc>
                 <a:extLst>
                   <a:ext uri="{0D108BD9-81ED-4DB2-BD59-A6C34878D82A}">
-                    <a16:rowId xmlns:a16="http://schemas.microsoft.com/office/drawing/2014/main" xmlns="" val="1501510031"/>
+                    <a16:rowId xmlns="" xmlns:a16="http://schemas.microsoft.com/office/drawing/2014/main" val="1501510031"/>
                   </a:ext>
                 </a:extLst>
               </a:tr>
@@ -3483,7 +3484,7 @@
                 </a:tc>
                 <a:extLst>
                   <a:ext uri="{0D108BD9-81ED-4DB2-BD59-A6C34878D82A}">
-                    <a16:rowId xmlns:a16="http://schemas.microsoft.com/office/drawing/2014/main" xmlns="" val="309591440"/>
+                    <a16:rowId xmlns="" xmlns:a16="http://schemas.microsoft.com/office/drawing/2014/main" val="309591440"/>
                   </a:ext>
                 </a:extLst>
               </a:tr>
@@ -3566,7 +3567,7 @@
                 </a:tc>
                 <a:extLst>
                   <a:ext uri="{0D108BD9-81ED-4DB2-BD59-A6C34878D82A}">
-                    <a16:rowId xmlns:a16="http://schemas.microsoft.com/office/drawing/2014/main" xmlns="" val="1374417764"/>
+                    <a16:rowId xmlns="" xmlns:a16="http://schemas.microsoft.com/office/drawing/2014/main" val="1374417764"/>
                   </a:ext>
                 </a:extLst>
               </a:tr>
@@ -3841,7 +3842,23 @@
             </a:r>
             <a:r>
               <a:rPr lang="en-GB" dirty="0"/>
-              <a:t>in March 2006 by Jack Dorsey, Noah Glass, Biz Stone and Evan Williams. </a:t>
+              <a:t>o</a:t>
+            </a:r>
+            <a:r>
+              <a:rPr lang="en-GB" dirty="0" smtClean="0"/>
+              <a:t>n </a:t>
+            </a:r>
+            <a:r>
+              <a:rPr lang="en-GB" dirty="0"/>
+              <a:t>March </a:t>
+            </a:r>
+            <a:r>
+              <a:rPr lang="en-GB" dirty="0" smtClean="0"/>
+              <a:t>in 2006 </a:t>
+            </a:r>
+            <a:r>
+              <a:rPr lang="en-GB" dirty="0"/>
+              <a:t>by Jack Dorsey, Noah Glass, Biz Stone and Evan Williams. </a:t>
             </a:r>
             <a:endParaRPr lang="en-GB" dirty="0" smtClean="0"/>
           </a:p>
@@ -3974,6 +3991,427 @@
   <p:clrMapOvr>
     <a:masterClrMapping/>
   </p:clrMapOvr>
+  <p:timing>
+    <p:tnLst>
+      <p:par>
+        <p:cTn id="1" dur="indefinite" restart="never" nodeType="tmRoot">
+          <p:childTnLst>
+            <p:seq concurrent="1" nextAc="seek">
+              <p:cTn id="2" dur="indefinite" nodeType="mainSeq">
+                <p:childTnLst>
+                  <p:par>
+                    <p:cTn id="3" fill="hold">
+                      <p:stCondLst>
+                        <p:cond delay="indefinite"/>
+                      </p:stCondLst>
+                      <p:childTnLst>
+                        <p:par>
+                          <p:cTn id="4" fill="hold">
+                            <p:stCondLst>
+                              <p:cond delay="0"/>
+                            </p:stCondLst>
+                            <p:childTnLst>
+                              <p:par>
+                                <p:cTn id="5" presetID="1" presetClass="entr" presetSubtype="0" fill="hold" grpId="0" nodeType="clickEffect">
+                                  <p:stCondLst>
+                                    <p:cond delay="0"/>
+                                  </p:stCondLst>
+                                  <p:childTnLst>
+                                    <p:set>
+                                      <p:cBhvr>
+                                        <p:cTn id="6" dur="1" fill="hold">
+                                          <p:stCondLst>
+                                            <p:cond delay="0"/>
+                                          </p:stCondLst>
+                                        </p:cTn>
+                                        <p:tgtEl>
+                                          <p:spTgt spid="2"/>
+                                        </p:tgtEl>
+                                        <p:attrNameLst>
+                                          <p:attrName>style.visibility</p:attrName>
+                                        </p:attrNameLst>
+                                      </p:cBhvr>
+                                      <p:to>
+                                        <p:strVal val="visible"/>
+                                      </p:to>
+                                    </p:set>
+                                  </p:childTnLst>
+                                </p:cTn>
+                              </p:par>
+                            </p:childTnLst>
+                          </p:cTn>
+                        </p:par>
+                      </p:childTnLst>
+                    </p:cTn>
+                  </p:par>
+                  <p:par>
+                    <p:cTn id="7" fill="hold">
+                      <p:stCondLst>
+                        <p:cond delay="indefinite"/>
+                      </p:stCondLst>
+                      <p:childTnLst>
+                        <p:par>
+                          <p:cTn id="8" fill="hold">
+                            <p:stCondLst>
+                              <p:cond delay="0"/>
+                            </p:stCondLst>
+                            <p:childTnLst>
+                              <p:par>
+                                <p:cTn id="9" presetID="1" presetClass="entr" presetSubtype="0" fill="hold" nodeType="clickEffect">
+                                  <p:stCondLst>
+                                    <p:cond delay="0"/>
+                                  </p:stCondLst>
+                                  <p:childTnLst>
+                                    <p:set>
+                                      <p:cBhvr>
+                                        <p:cTn id="10" dur="1" fill="hold">
+                                          <p:stCondLst>
+                                            <p:cond delay="0"/>
+                                          </p:stCondLst>
+                                        </p:cTn>
+                                        <p:tgtEl>
+                                          <p:spTgt spid="3">
+                                            <p:txEl>
+                                              <p:pRg st="0" end="0"/>
+                                            </p:txEl>
+                                          </p:spTgt>
+                                        </p:tgtEl>
+                                        <p:attrNameLst>
+                                          <p:attrName>style.visibility</p:attrName>
+                                        </p:attrNameLst>
+                                      </p:cBhvr>
+                                      <p:to>
+                                        <p:strVal val="visible"/>
+                                      </p:to>
+                                    </p:set>
+                                  </p:childTnLst>
+                                </p:cTn>
+                              </p:par>
+                            </p:childTnLst>
+                          </p:cTn>
+                        </p:par>
+                      </p:childTnLst>
+                    </p:cTn>
+                  </p:par>
+                  <p:par>
+                    <p:cTn id="11" fill="hold">
+                      <p:stCondLst>
+                        <p:cond delay="indefinite"/>
+                      </p:stCondLst>
+                      <p:childTnLst>
+                        <p:par>
+                          <p:cTn id="12" fill="hold">
+                            <p:stCondLst>
+                              <p:cond delay="0"/>
+                            </p:stCondLst>
+                            <p:childTnLst>
+                              <p:par>
+                                <p:cTn id="13" presetID="1" presetClass="entr" presetSubtype="0" fill="hold" nodeType="clickEffect">
+                                  <p:stCondLst>
+                                    <p:cond delay="0"/>
+                                  </p:stCondLst>
+                                  <p:childTnLst>
+                                    <p:set>
+                                      <p:cBhvr>
+                                        <p:cTn id="14" dur="1" fill="hold">
+                                          <p:stCondLst>
+                                            <p:cond delay="0"/>
+                                          </p:stCondLst>
+                                        </p:cTn>
+                                        <p:tgtEl>
+                                          <p:spTgt spid="3">
+                                            <p:txEl>
+                                              <p:pRg st="1" end="1"/>
+                                            </p:txEl>
+                                          </p:spTgt>
+                                        </p:tgtEl>
+                                        <p:attrNameLst>
+                                          <p:attrName>style.visibility</p:attrName>
+                                        </p:attrNameLst>
+                                      </p:cBhvr>
+                                      <p:to>
+                                        <p:strVal val="visible"/>
+                                      </p:to>
+                                    </p:set>
+                                  </p:childTnLst>
+                                </p:cTn>
+                              </p:par>
+                            </p:childTnLst>
+                          </p:cTn>
+                        </p:par>
+                      </p:childTnLst>
+                    </p:cTn>
+                  </p:par>
+                  <p:par>
+                    <p:cTn id="15" fill="hold">
+                      <p:stCondLst>
+                        <p:cond delay="indefinite"/>
+                      </p:stCondLst>
+                      <p:childTnLst>
+                        <p:par>
+                          <p:cTn id="16" fill="hold">
+                            <p:stCondLst>
+                              <p:cond delay="0"/>
+                            </p:stCondLst>
+                            <p:childTnLst>
+                              <p:par>
+                                <p:cTn id="17" presetID="1" presetClass="entr" presetSubtype="0" fill="hold" nodeType="clickEffect">
+                                  <p:stCondLst>
+                                    <p:cond delay="0"/>
+                                  </p:stCondLst>
+                                  <p:childTnLst>
+                                    <p:set>
+                                      <p:cBhvr>
+                                        <p:cTn id="18" dur="1" fill="hold">
+                                          <p:stCondLst>
+                                            <p:cond delay="0"/>
+                                          </p:stCondLst>
+                                        </p:cTn>
+                                        <p:tgtEl>
+                                          <p:spTgt spid="3">
+                                            <p:txEl>
+                                              <p:pRg st="3" end="3"/>
+                                            </p:txEl>
+                                          </p:spTgt>
+                                        </p:tgtEl>
+                                        <p:attrNameLst>
+                                          <p:attrName>style.visibility</p:attrName>
+                                        </p:attrNameLst>
+                                      </p:cBhvr>
+                                      <p:to>
+                                        <p:strVal val="visible"/>
+                                      </p:to>
+                                    </p:set>
+                                  </p:childTnLst>
+                                </p:cTn>
+                              </p:par>
+                            </p:childTnLst>
+                          </p:cTn>
+                        </p:par>
+                      </p:childTnLst>
+                    </p:cTn>
+                  </p:par>
+                  <p:par>
+                    <p:cTn id="19" fill="hold">
+                      <p:stCondLst>
+                        <p:cond delay="indefinite"/>
+                      </p:stCondLst>
+                      <p:childTnLst>
+                        <p:par>
+                          <p:cTn id="20" fill="hold">
+                            <p:stCondLst>
+                              <p:cond delay="0"/>
+                            </p:stCondLst>
+                            <p:childTnLst>
+                              <p:par>
+                                <p:cTn id="21" presetID="1" presetClass="entr" presetSubtype="0" fill="hold" nodeType="clickEffect">
+                                  <p:stCondLst>
+                                    <p:cond delay="0"/>
+                                  </p:stCondLst>
+                                  <p:childTnLst>
+                                    <p:set>
+                                      <p:cBhvr>
+                                        <p:cTn id="22" dur="1" fill="hold">
+                                          <p:stCondLst>
+                                            <p:cond delay="0"/>
+                                          </p:stCondLst>
+                                        </p:cTn>
+                                        <p:tgtEl>
+                                          <p:spTgt spid="3">
+                                            <p:txEl>
+                                              <p:pRg st="4" end="4"/>
+                                            </p:txEl>
+                                          </p:spTgt>
+                                        </p:tgtEl>
+                                        <p:attrNameLst>
+                                          <p:attrName>style.visibility</p:attrName>
+                                        </p:attrNameLst>
+                                      </p:cBhvr>
+                                      <p:to>
+                                        <p:strVal val="visible"/>
+                                      </p:to>
+                                    </p:set>
+                                  </p:childTnLst>
+                                </p:cTn>
+                              </p:par>
+                            </p:childTnLst>
+                          </p:cTn>
+                        </p:par>
+                      </p:childTnLst>
+                    </p:cTn>
+                  </p:par>
+                  <p:par>
+                    <p:cTn id="23" fill="hold">
+                      <p:stCondLst>
+                        <p:cond delay="indefinite"/>
+                      </p:stCondLst>
+                      <p:childTnLst>
+                        <p:par>
+                          <p:cTn id="24" fill="hold">
+                            <p:stCondLst>
+                              <p:cond delay="0"/>
+                            </p:stCondLst>
+                            <p:childTnLst>
+                              <p:par>
+                                <p:cTn id="25" presetID="1" presetClass="entr" presetSubtype="0" fill="hold" nodeType="clickEffect">
+                                  <p:stCondLst>
+                                    <p:cond delay="0"/>
+                                  </p:stCondLst>
+                                  <p:childTnLst>
+                                    <p:set>
+                                      <p:cBhvr>
+                                        <p:cTn id="26" dur="1" fill="hold">
+                                          <p:stCondLst>
+                                            <p:cond delay="0"/>
+                                          </p:stCondLst>
+                                        </p:cTn>
+                                        <p:tgtEl>
+                                          <p:spTgt spid="3">
+                                            <p:txEl>
+                                              <p:pRg st="5" end="5"/>
+                                            </p:txEl>
+                                          </p:spTgt>
+                                        </p:tgtEl>
+                                        <p:attrNameLst>
+                                          <p:attrName>style.visibility</p:attrName>
+                                        </p:attrNameLst>
+                                      </p:cBhvr>
+                                      <p:to>
+                                        <p:strVal val="visible"/>
+                                      </p:to>
+                                    </p:set>
+                                  </p:childTnLst>
+                                </p:cTn>
+                              </p:par>
+                            </p:childTnLst>
+                          </p:cTn>
+                        </p:par>
+                      </p:childTnLst>
+                    </p:cTn>
+                  </p:par>
+                  <p:par>
+                    <p:cTn id="27" fill="hold">
+                      <p:stCondLst>
+                        <p:cond delay="indefinite"/>
+                      </p:stCondLst>
+                      <p:childTnLst>
+                        <p:par>
+                          <p:cTn id="28" fill="hold">
+                            <p:stCondLst>
+                              <p:cond delay="0"/>
+                            </p:stCondLst>
+                            <p:childTnLst>
+                              <p:par>
+                                <p:cTn id="29" presetID="1" presetClass="entr" presetSubtype="0" fill="hold" nodeType="clickEffect">
+                                  <p:stCondLst>
+                                    <p:cond delay="0"/>
+                                  </p:stCondLst>
+                                  <p:childTnLst>
+                                    <p:set>
+                                      <p:cBhvr>
+                                        <p:cTn id="30" dur="1" fill="hold">
+                                          <p:stCondLst>
+                                            <p:cond delay="0"/>
+                                          </p:stCondLst>
+                                        </p:cTn>
+                                        <p:tgtEl>
+                                          <p:spTgt spid="3">
+                                            <p:txEl>
+                                              <p:pRg st="6" end="6"/>
+                                            </p:txEl>
+                                          </p:spTgt>
+                                        </p:tgtEl>
+                                        <p:attrNameLst>
+                                          <p:attrName>style.visibility</p:attrName>
+                                        </p:attrNameLst>
+                                      </p:cBhvr>
+                                      <p:to>
+                                        <p:strVal val="visible"/>
+                                      </p:to>
+                                    </p:set>
+                                  </p:childTnLst>
+                                </p:cTn>
+                              </p:par>
+                            </p:childTnLst>
+                          </p:cTn>
+                        </p:par>
+                      </p:childTnLst>
+                    </p:cTn>
+                  </p:par>
+                  <p:par>
+                    <p:cTn id="31" fill="hold">
+                      <p:stCondLst>
+                        <p:cond delay="indefinite"/>
+                      </p:stCondLst>
+                      <p:childTnLst>
+                        <p:par>
+                          <p:cTn id="32" fill="hold">
+                            <p:stCondLst>
+                              <p:cond delay="0"/>
+                            </p:stCondLst>
+                            <p:childTnLst>
+                              <p:par>
+                                <p:cTn id="33" presetID="1" presetClass="entr" presetSubtype="0" fill="hold" nodeType="clickEffect">
+                                  <p:stCondLst>
+                                    <p:cond delay="0"/>
+                                  </p:stCondLst>
+                                  <p:childTnLst>
+                                    <p:set>
+                                      <p:cBhvr>
+                                        <p:cTn id="34" dur="1" fill="hold">
+                                          <p:stCondLst>
+                                            <p:cond delay="0"/>
+                                          </p:stCondLst>
+                                        </p:cTn>
+                                        <p:tgtEl>
+                                          <p:spTgt spid="3">
+                                            <p:txEl>
+                                              <p:pRg st="7" end="7"/>
+                                            </p:txEl>
+                                          </p:spTgt>
+                                        </p:tgtEl>
+                                        <p:attrNameLst>
+                                          <p:attrName>style.visibility</p:attrName>
+                                        </p:attrNameLst>
+                                      </p:cBhvr>
+                                      <p:to>
+                                        <p:strVal val="visible"/>
+                                      </p:to>
+                                    </p:set>
+                                  </p:childTnLst>
+                                </p:cTn>
+                              </p:par>
+                            </p:childTnLst>
+                          </p:cTn>
+                        </p:par>
+                      </p:childTnLst>
+                    </p:cTn>
+                  </p:par>
+                </p:childTnLst>
+              </p:cTn>
+              <p:prevCondLst>
+                <p:cond evt="onPrev" delay="0">
+                  <p:tgtEl>
+                    <p:sldTgt/>
+                  </p:tgtEl>
+                </p:cond>
+              </p:prevCondLst>
+              <p:nextCondLst>
+                <p:cond evt="onNext" delay="0">
+                  <p:tgtEl>
+                    <p:sldTgt/>
+                  </p:tgtEl>
+                </p:cond>
+              </p:nextCondLst>
+            </p:seq>
+          </p:childTnLst>
+        </p:cTn>
+      </p:par>
+    </p:tnLst>
+    <p:bldLst>
+      <p:bldP spid="2" grpId="0"/>
+    </p:bldLst>
+  </p:timing>
 </p:sld>
 </file>
 
@@ -4046,7 +4484,7 @@
           <a:lstStyle/>
           <a:p>
             <a:r>
-              <a:rPr lang="en-GB" dirty="0"/>
+              <a:rPr lang="en-GB" dirty="0" smtClean="0"/>
               <a:t>created </a:t>
             </a:r>
             <a:r>
@@ -4413,6 +4851,81 @@
 </p:sld>
 </file>
 
+<file path=ppt/slides/slide4.xml><?xml version="1.0" encoding="utf-8"?>
+<p:sld xmlns:a="http://schemas.openxmlformats.org/drawingml/2006/main" xmlns:r="http://schemas.openxmlformats.org/officeDocument/2006/relationships" xmlns:p="http://schemas.openxmlformats.org/presentationml/2006/main">
+  <p:cSld>
+    <p:spTree>
+      <p:nvGrpSpPr>
+        <p:cNvPr id="1" name=""/>
+        <p:cNvGrpSpPr/>
+        <p:nvPr/>
+      </p:nvGrpSpPr>
+      <p:grpSpPr>
+        <a:xfrm>
+          <a:off x="0" y="0"/>
+          <a:ext cx="0" cy="0"/>
+          <a:chOff x="0" y="0"/>
+          <a:chExt cx="0" cy="0"/>
+        </a:xfrm>
+      </p:grpSpPr>
+      <p:sp>
+        <p:nvSpPr>
+          <p:cNvPr id="2" name="Title 1"/>
+          <p:cNvSpPr>
+            <a:spLocks noGrp="1"/>
+          </p:cNvSpPr>
+          <p:nvPr>
+            <p:ph type="title"/>
+          </p:nvPr>
+        </p:nvSpPr>
+        <p:spPr/>
+        <p:txBody>
+          <a:bodyPr/>
+          <a:lstStyle/>
+          <a:p>
+            <a:endParaRPr lang="en-GB"/>
+          </a:p>
+        </p:txBody>
+      </p:sp>
+      <p:sp>
+        <p:nvSpPr>
+          <p:cNvPr id="3" name="Content Placeholder 2"/>
+          <p:cNvSpPr>
+            <a:spLocks noGrp="1"/>
+          </p:cNvSpPr>
+          <p:nvPr>
+            <p:ph idx="1"/>
+          </p:nvPr>
+        </p:nvSpPr>
+        <p:spPr/>
+        <p:txBody>
+          <a:bodyPr/>
+          <a:lstStyle/>
+          <a:p>
+            <a:endParaRPr lang="en-GB"/>
+          </a:p>
+        </p:txBody>
+      </p:sp>
+    </p:spTree>
+    <p:extLst>
+      <p:ext uri="{BB962C8B-B14F-4D97-AF65-F5344CB8AC3E}">
+        <p14:creationId xmlns:p14="http://schemas.microsoft.com/office/powerpoint/2010/main" val="1070065351"/>
+      </p:ext>
+    </p:extLst>
+  </p:cSld>
+  <p:clrMapOvr>
+    <a:masterClrMapping/>
+  </p:clrMapOvr>
+  <p:timing>
+    <p:tnLst>
+      <p:par>
+        <p:cTn id="1" dur="indefinite" restart="never" nodeType="tmRoot"/>
+      </p:par>
+    </p:tnLst>
+  </p:timing>
+</p:sld>
+</file>
+
 <file path=ppt/theme/theme1.xml><?xml version="1.0" encoding="utf-8"?>
 <a:theme xmlns:a="http://schemas.openxmlformats.org/drawingml/2006/main" name="Office Theme">
   <a:themeElements>

</xml_diff>

<commit_message>
Add ur slides here
</commit_message>
<xml_diff>
--- a/DSN-QRL-GR2.pptx
+++ b/DSN-QRL-GR2.pptx
@@ -3049,14 +3049,14 @@
                 <a:gridCol w="2232910">
                   <a:extLst>
                     <a:ext uri="{9D8B030D-6E8A-4147-A177-3AD203B41FA5}">
-                      <a16:colId xmlns="" xmlns:a16="http://schemas.microsoft.com/office/drawing/2014/main" val="2582641705"/>
+                      <a16:colId xmlns:a16="http://schemas.microsoft.com/office/drawing/2014/main" xmlns="" val="2582641705"/>
                     </a:ext>
                   </a:extLst>
                 </a:gridCol>
                 <a:gridCol w="3200481">
                   <a:extLst>
                     <a:ext uri="{9D8B030D-6E8A-4147-A177-3AD203B41FA5}">
-                      <a16:colId xmlns="" xmlns:a16="http://schemas.microsoft.com/office/drawing/2014/main" val="1931994600"/>
+                      <a16:colId xmlns:a16="http://schemas.microsoft.com/office/drawing/2014/main" xmlns="" val="1931994600"/>
                     </a:ext>
                   </a:extLst>
                 </a:gridCol>
@@ -3128,7 +3128,7 @@
                 </a:tc>
                 <a:extLst>
                   <a:ext uri="{0D108BD9-81ED-4DB2-BD59-A6C34878D82A}">
-                    <a16:rowId xmlns="" xmlns:a16="http://schemas.microsoft.com/office/drawing/2014/main" val="3811032526"/>
+                    <a16:rowId xmlns:a16="http://schemas.microsoft.com/office/drawing/2014/main" xmlns="" val="3811032526"/>
                   </a:ext>
                 </a:extLst>
               </a:tr>
@@ -3217,7 +3217,7 @@
                 </a:tc>
                 <a:extLst>
                   <a:ext uri="{0D108BD9-81ED-4DB2-BD59-A6C34878D82A}">
-                    <a16:rowId xmlns="" xmlns:a16="http://schemas.microsoft.com/office/drawing/2014/main" val="2839484681"/>
+                    <a16:rowId xmlns:a16="http://schemas.microsoft.com/office/drawing/2014/main" xmlns="" val="2839484681"/>
                   </a:ext>
                 </a:extLst>
               </a:tr>
@@ -3306,7 +3306,7 @@
                 </a:tc>
                 <a:extLst>
                   <a:ext uri="{0D108BD9-81ED-4DB2-BD59-A6C34878D82A}">
-                    <a16:rowId xmlns="" xmlns:a16="http://schemas.microsoft.com/office/drawing/2014/main" val="3842791150"/>
+                    <a16:rowId xmlns:a16="http://schemas.microsoft.com/office/drawing/2014/main" xmlns="" val="3842791150"/>
                   </a:ext>
                 </a:extLst>
               </a:tr>
@@ -3389,7 +3389,7 @@
                 </a:tc>
                 <a:extLst>
                   <a:ext uri="{0D108BD9-81ED-4DB2-BD59-A6C34878D82A}">
-                    <a16:rowId xmlns="" xmlns:a16="http://schemas.microsoft.com/office/drawing/2014/main" val="1501510031"/>
+                    <a16:rowId xmlns:a16="http://schemas.microsoft.com/office/drawing/2014/main" xmlns="" val="1501510031"/>
                   </a:ext>
                 </a:extLst>
               </a:tr>
@@ -3484,7 +3484,7 @@
                 </a:tc>
                 <a:extLst>
                   <a:ext uri="{0D108BD9-81ED-4DB2-BD59-A6C34878D82A}">
-                    <a16:rowId xmlns="" xmlns:a16="http://schemas.microsoft.com/office/drawing/2014/main" val="309591440"/>
+                    <a16:rowId xmlns:a16="http://schemas.microsoft.com/office/drawing/2014/main" xmlns="" val="309591440"/>
                   </a:ext>
                 </a:extLst>
               </a:tr>
@@ -3567,7 +3567,7 @@
                 </a:tc>
                 <a:extLst>
                   <a:ext uri="{0D108BD9-81ED-4DB2-BD59-A6C34878D82A}">
-                    <a16:rowId xmlns="" xmlns:a16="http://schemas.microsoft.com/office/drawing/2014/main" val="1374417764"/>
+                    <a16:rowId xmlns:a16="http://schemas.microsoft.com/office/drawing/2014/main" xmlns="" val="1374417764"/>
                   </a:ext>
                 </a:extLst>
               </a:tr>
@@ -3635,7 +3635,7 @@
             </a:r>
             <a:r>
               <a:rPr lang="en-GB" b="1" dirty="0"/>
-              <a:t>Twitter</a:t>
+              <a:t>Social Networks</a:t>
             </a:r>
             <a:endParaRPr lang="en-US" dirty="0"/>
           </a:p>

</xml_diff>

<commit_message>
Added all my slides need reviews
</commit_message>
<xml_diff>
--- a/DSN-QRL-GR2.pptx
+++ b/DSN-QRL-GR2.pptx
@@ -10,7 +10,9 @@
     <p:sldId id="257" r:id="rId4"/>
     <p:sldId id="259" r:id="rId5"/>
     <p:sldId id="261" r:id="rId6"/>
-    <p:sldId id="260" r:id="rId7"/>
+    <p:sldId id="262" r:id="rId7"/>
+    <p:sldId id="263" r:id="rId8"/>
+    <p:sldId id="260" r:id="rId9"/>
   </p:sldIdLst>
   <p:sldSz cx="12192000" cy="6858000"/>
   <p:notesSz cx="6858000" cy="9144000"/>
@@ -248,7 +250,7 @@
           <a:p>
             <a:fld id="{1AA62091-D445-4616-BF72-A845EF00C139}" type="datetimeFigureOut">
               <a:rPr lang="en-GB" smtClean="0"/>
-              <a:t>11/05/2017</a:t>
+              <a:t>13/05/2017</a:t>
             </a:fld>
             <a:endParaRPr lang="en-GB"/>
           </a:p>
@@ -418,7 +420,7 @@
           <a:p>
             <a:fld id="{1AA62091-D445-4616-BF72-A845EF00C139}" type="datetimeFigureOut">
               <a:rPr lang="en-GB" smtClean="0"/>
-              <a:t>11/05/2017</a:t>
+              <a:t>13/05/2017</a:t>
             </a:fld>
             <a:endParaRPr lang="en-GB"/>
           </a:p>
@@ -598,7 +600,7 @@
           <a:p>
             <a:fld id="{1AA62091-D445-4616-BF72-A845EF00C139}" type="datetimeFigureOut">
               <a:rPr lang="en-GB" smtClean="0"/>
-              <a:t>11/05/2017</a:t>
+              <a:t>13/05/2017</a:t>
             </a:fld>
             <a:endParaRPr lang="en-GB"/>
           </a:p>
@@ -768,7 +770,7 @@
           <a:p>
             <a:fld id="{1AA62091-D445-4616-BF72-A845EF00C139}" type="datetimeFigureOut">
               <a:rPr lang="en-GB" smtClean="0"/>
-              <a:t>11/05/2017</a:t>
+              <a:t>13/05/2017</a:t>
             </a:fld>
             <a:endParaRPr lang="en-GB"/>
           </a:p>
@@ -1014,7 +1016,7 @@
           <a:p>
             <a:fld id="{1AA62091-D445-4616-BF72-A845EF00C139}" type="datetimeFigureOut">
               <a:rPr lang="en-GB" smtClean="0"/>
-              <a:t>11/05/2017</a:t>
+              <a:t>13/05/2017</a:t>
             </a:fld>
             <a:endParaRPr lang="en-GB"/>
           </a:p>
@@ -1246,7 +1248,7 @@
           <a:p>
             <a:fld id="{1AA62091-D445-4616-BF72-A845EF00C139}" type="datetimeFigureOut">
               <a:rPr lang="en-GB" smtClean="0"/>
-              <a:t>11/05/2017</a:t>
+              <a:t>13/05/2017</a:t>
             </a:fld>
             <a:endParaRPr lang="en-GB"/>
           </a:p>
@@ -1613,7 +1615,7 @@
           <a:p>
             <a:fld id="{1AA62091-D445-4616-BF72-A845EF00C139}" type="datetimeFigureOut">
               <a:rPr lang="en-GB" smtClean="0"/>
-              <a:t>11/05/2017</a:t>
+              <a:t>13/05/2017</a:t>
             </a:fld>
             <a:endParaRPr lang="en-GB"/>
           </a:p>
@@ -1731,7 +1733,7 @@
           <a:p>
             <a:fld id="{1AA62091-D445-4616-BF72-A845EF00C139}" type="datetimeFigureOut">
               <a:rPr lang="en-GB" smtClean="0"/>
-              <a:t>11/05/2017</a:t>
+              <a:t>13/05/2017</a:t>
             </a:fld>
             <a:endParaRPr lang="en-GB"/>
           </a:p>
@@ -1826,7 +1828,7 @@
           <a:p>
             <a:fld id="{1AA62091-D445-4616-BF72-A845EF00C139}" type="datetimeFigureOut">
               <a:rPr lang="en-GB" smtClean="0"/>
-              <a:t>11/05/2017</a:t>
+              <a:t>13/05/2017</a:t>
             </a:fld>
             <a:endParaRPr lang="en-GB"/>
           </a:p>
@@ -2103,7 +2105,7 @@
           <a:p>
             <a:fld id="{1AA62091-D445-4616-BF72-A845EF00C139}" type="datetimeFigureOut">
               <a:rPr lang="en-GB" smtClean="0"/>
-              <a:t>11/05/2017</a:t>
+              <a:t>13/05/2017</a:t>
             </a:fld>
             <a:endParaRPr lang="en-GB"/>
           </a:p>
@@ -2356,7 +2358,7 @@
           <a:p>
             <a:fld id="{1AA62091-D445-4616-BF72-A845EF00C139}" type="datetimeFigureOut">
               <a:rPr lang="en-GB" smtClean="0"/>
-              <a:t>11/05/2017</a:t>
+              <a:t>13/05/2017</a:t>
             </a:fld>
             <a:endParaRPr lang="en-GB"/>
           </a:p>
@@ -2569,7 +2571,7 @@
           <a:p>
             <a:fld id="{1AA62091-D445-4616-BF72-A845EF00C139}" type="datetimeFigureOut">
               <a:rPr lang="en-GB" smtClean="0"/>
-              <a:t>11/05/2017</a:t>
+              <a:t>13/05/2017</a:t>
             </a:fld>
             <a:endParaRPr lang="en-GB"/>
           </a:p>
@@ -3051,14 +3053,14 @@
                 <a:gridCol w="2232910">
                   <a:extLst>
                     <a:ext uri="{9D8B030D-6E8A-4147-A177-3AD203B41FA5}">
-                      <a16:colId xmlns:a16="http://schemas.microsoft.com/office/drawing/2014/main" xmlns="" val="2582641705"/>
+                      <a16:colId xmlns="" xmlns:a16="http://schemas.microsoft.com/office/drawing/2014/main" val="2582641705"/>
                     </a:ext>
                   </a:extLst>
                 </a:gridCol>
                 <a:gridCol w="3200481">
                   <a:extLst>
                     <a:ext uri="{9D8B030D-6E8A-4147-A177-3AD203B41FA5}">
-                      <a16:colId xmlns:a16="http://schemas.microsoft.com/office/drawing/2014/main" xmlns="" val="1931994600"/>
+                      <a16:colId xmlns="" xmlns:a16="http://schemas.microsoft.com/office/drawing/2014/main" val="1931994600"/>
                     </a:ext>
                   </a:extLst>
                 </a:gridCol>
@@ -3130,7 +3132,7 @@
                 </a:tc>
                 <a:extLst>
                   <a:ext uri="{0D108BD9-81ED-4DB2-BD59-A6C34878D82A}">
-                    <a16:rowId xmlns:a16="http://schemas.microsoft.com/office/drawing/2014/main" xmlns="" val="3811032526"/>
+                    <a16:rowId xmlns="" xmlns:a16="http://schemas.microsoft.com/office/drawing/2014/main" val="3811032526"/>
                   </a:ext>
                 </a:extLst>
               </a:tr>
@@ -3219,7 +3221,7 @@
                 </a:tc>
                 <a:extLst>
                   <a:ext uri="{0D108BD9-81ED-4DB2-BD59-A6C34878D82A}">
-                    <a16:rowId xmlns:a16="http://schemas.microsoft.com/office/drawing/2014/main" xmlns="" val="2839484681"/>
+                    <a16:rowId xmlns="" xmlns:a16="http://schemas.microsoft.com/office/drawing/2014/main" val="2839484681"/>
                   </a:ext>
                 </a:extLst>
               </a:tr>
@@ -3308,7 +3310,7 @@
                 </a:tc>
                 <a:extLst>
                   <a:ext uri="{0D108BD9-81ED-4DB2-BD59-A6C34878D82A}">
-                    <a16:rowId xmlns:a16="http://schemas.microsoft.com/office/drawing/2014/main" xmlns="" val="3842791150"/>
+                    <a16:rowId xmlns="" xmlns:a16="http://schemas.microsoft.com/office/drawing/2014/main" val="3842791150"/>
                   </a:ext>
                 </a:extLst>
               </a:tr>
@@ -3391,7 +3393,7 @@
                 </a:tc>
                 <a:extLst>
                   <a:ext uri="{0D108BD9-81ED-4DB2-BD59-A6C34878D82A}">
-                    <a16:rowId xmlns:a16="http://schemas.microsoft.com/office/drawing/2014/main" xmlns="" val="1501510031"/>
+                    <a16:rowId xmlns="" xmlns:a16="http://schemas.microsoft.com/office/drawing/2014/main" val="1501510031"/>
                   </a:ext>
                 </a:extLst>
               </a:tr>
@@ -3486,7 +3488,7 @@
                 </a:tc>
                 <a:extLst>
                   <a:ext uri="{0D108BD9-81ED-4DB2-BD59-A6C34878D82A}">
-                    <a16:rowId xmlns:a16="http://schemas.microsoft.com/office/drawing/2014/main" xmlns="" val="309591440"/>
+                    <a16:rowId xmlns="" xmlns:a16="http://schemas.microsoft.com/office/drawing/2014/main" val="309591440"/>
                   </a:ext>
                 </a:extLst>
               </a:tr>
@@ -3569,7 +3571,7 @@
                 </a:tc>
                 <a:extLst>
                   <a:ext uri="{0D108BD9-81ED-4DB2-BD59-A6C34878D82A}">
-                    <a16:rowId xmlns:a16="http://schemas.microsoft.com/office/drawing/2014/main" xmlns="" val="1374417764"/>
+                    <a16:rowId xmlns="" xmlns:a16="http://schemas.microsoft.com/office/drawing/2014/main" val="1374417764"/>
                   </a:ext>
                 </a:extLst>
               </a:tr>
@@ -4927,11 +4929,7 @@
           <a:p>
             <a:r>
               <a:rPr lang="en-IN" dirty="0" smtClean="0"/>
-              <a:t>SXSW </a:t>
-            </a:r>
-            <a:r>
-              <a:rPr lang="en-IN" dirty="0" smtClean="0"/>
-              <a:t>conference in 2007- From 20,000 to 60,000 daily messages.</a:t>
+              <a:t>SXSW conference in 2007- From 20,000 to 60,000 daily messages.</a:t>
             </a:r>
           </a:p>
           <a:p>
@@ -5051,9 +5049,331 @@
   <p:timing>
     <p:tnLst>
       <p:par>
-        <p:cTn id="1" dur="indefinite" restart="never" nodeType="tmRoot"/>
+        <p:cTn id="1" dur="indefinite" restart="never" nodeType="tmRoot">
+          <p:childTnLst>
+            <p:seq concurrent="1" nextAc="seek">
+              <p:cTn id="2" dur="indefinite" nodeType="mainSeq">
+                <p:childTnLst>
+                  <p:par>
+                    <p:cTn id="3" fill="hold">
+                      <p:stCondLst>
+                        <p:cond delay="indefinite"/>
+                      </p:stCondLst>
+                      <p:childTnLst>
+                        <p:par>
+                          <p:cTn id="4" fill="hold">
+                            <p:stCondLst>
+                              <p:cond delay="0"/>
+                            </p:stCondLst>
+                            <p:childTnLst>
+                              <p:par>
+                                <p:cTn id="5" presetID="1" presetClass="entr" presetSubtype="0" fill="hold" grpId="0" nodeType="clickEffect">
+                                  <p:stCondLst>
+                                    <p:cond delay="0"/>
+                                  </p:stCondLst>
+                                  <p:childTnLst>
+                                    <p:set>
+                                      <p:cBhvr>
+                                        <p:cTn id="6" dur="1" fill="hold">
+                                          <p:stCondLst>
+                                            <p:cond delay="0"/>
+                                          </p:stCondLst>
+                                        </p:cTn>
+                                        <p:tgtEl>
+                                          <p:spTgt spid="2"/>
+                                        </p:tgtEl>
+                                        <p:attrNameLst>
+                                          <p:attrName>style.visibility</p:attrName>
+                                        </p:attrNameLst>
+                                      </p:cBhvr>
+                                      <p:to>
+                                        <p:strVal val="visible"/>
+                                      </p:to>
+                                    </p:set>
+                                  </p:childTnLst>
+                                </p:cTn>
+                              </p:par>
+                              <p:par>
+                                <p:cTn id="7" presetID="1" presetClass="entr" presetSubtype="0" fill="hold" nodeType="withEffect">
+                                  <p:stCondLst>
+                                    <p:cond delay="0"/>
+                                  </p:stCondLst>
+                                  <p:childTnLst>
+                                    <p:set>
+                                      <p:cBhvr>
+                                        <p:cTn id="8" dur="1" fill="hold">
+                                          <p:stCondLst>
+                                            <p:cond delay="0"/>
+                                          </p:stCondLst>
+                                        </p:cTn>
+                                        <p:tgtEl>
+                                          <p:spTgt spid="6"/>
+                                        </p:tgtEl>
+                                        <p:attrNameLst>
+                                          <p:attrName>style.visibility</p:attrName>
+                                        </p:attrNameLst>
+                                      </p:cBhvr>
+                                      <p:to>
+                                        <p:strVal val="visible"/>
+                                      </p:to>
+                                    </p:set>
+                                  </p:childTnLst>
+                                </p:cTn>
+                              </p:par>
+                            </p:childTnLst>
+                          </p:cTn>
+                        </p:par>
+                      </p:childTnLst>
+                    </p:cTn>
+                  </p:par>
+                  <p:par>
+                    <p:cTn id="9" fill="hold">
+                      <p:stCondLst>
+                        <p:cond delay="indefinite"/>
+                      </p:stCondLst>
+                      <p:childTnLst>
+                        <p:par>
+                          <p:cTn id="10" fill="hold">
+                            <p:stCondLst>
+                              <p:cond delay="0"/>
+                            </p:stCondLst>
+                            <p:childTnLst>
+                              <p:par>
+                                <p:cTn id="11" presetID="1" presetClass="entr" presetSubtype="0" fill="hold" grpId="0" nodeType="clickEffect">
+                                  <p:stCondLst>
+                                    <p:cond delay="0"/>
+                                  </p:stCondLst>
+                                  <p:childTnLst>
+                                    <p:set>
+                                      <p:cBhvr>
+                                        <p:cTn id="12" dur="1" fill="hold">
+                                          <p:stCondLst>
+                                            <p:cond delay="0"/>
+                                          </p:stCondLst>
+                                        </p:cTn>
+                                        <p:tgtEl>
+                                          <p:spTgt spid="5">
+                                            <p:txEl>
+                                              <p:pRg st="0" end="0"/>
+                                            </p:txEl>
+                                          </p:spTgt>
+                                        </p:tgtEl>
+                                        <p:attrNameLst>
+                                          <p:attrName>style.visibility</p:attrName>
+                                        </p:attrNameLst>
+                                      </p:cBhvr>
+                                      <p:to>
+                                        <p:strVal val="visible"/>
+                                      </p:to>
+                                    </p:set>
+                                  </p:childTnLst>
+                                </p:cTn>
+                              </p:par>
+                            </p:childTnLst>
+                          </p:cTn>
+                        </p:par>
+                      </p:childTnLst>
+                    </p:cTn>
+                  </p:par>
+                  <p:par>
+                    <p:cTn id="13" fill="hold">
+                      <p:stCondLst>
+                        <p:cond delay="indefinite"/>
+                      </p:stCondLst>
+                      <p:childTnLst>
+                        <p:par>
+                          <p:cTn id="14" fill="hold">
+                            <p:stCondLst>
+                              <p:cond delay="0"/>
+                            </p:stCondLst>
+                            <p:childTnLst>
+                              <p:par>
+                                <p:cTn id="15" presetID="1" presetClass="entr" presetSubtype="0" fill="hold" grpId="0" nodeType="clickEffect">
+                                  <p:stCondLst>
+                                    <p:cond delay="0"/>
+                                  </p:stCondLst>
+                                  <p:childTnLst>
+                                    <p:set>
+                                      <p:cBhvr>
+                                        <p:cTn id="16" dur="1" fill="hold">
+                                          <p:stCondLst>
+                                            <p:cond delay="0"/>
+                                          </p:stCondLst>
+                                        </p:cTn>
+                                        <p:tgtEl>
+                                          <p:spTgt spid="5">
+                                            <p:txEl>
+                                              <p:pRg st="1" end="1"/>
+                                            </p:txEl>
+                                          </p:spTgt>
+                                        </p:tgtEl>
+                                        <p:attrNameLst>
+                                          <p:attrName>style.visibility</p:attrName>
+                                        </p:attrNameLst>
+                                      </p:cBhvr>
+                                      <p:to>
+                                        <p:strVal val="visible"/>
+                                      </p:to>
+                                    </p:set>
+                                  </p:childTnLst>
+                                </p:cTn>
+                              </p:par>
+                            </p:childTnLst>
+                          </p:cTn>
+                        </p:par>
+                      </p:childTnLst>
+                    </p:cTn>
+                  </p:par>
+                  <p:par>
+                    <p:cTn id="17" fill="hold">
+                      <p:stCondLst>
+                        <p:cond delay="indefinite"/>
+                      </p:stCondLst>
+                      <p:childTnLst>
+                        <p:par>
+                          <p:cTn id="18" fill="hold">
+                            <p:stCondLst>
+                              <p:cond delay="0"/>
+                            </p:stCondLst>
+                            <p:childTnLst>
+                              <p:par>
+                                <p:cTn id="19" presetID="1" presetClass="entr" presetSubtype="0" fill="hold" grpId="0" nodeType="clickEffect">
+                                  <p:stCondLst>
+                                    <p:cond delay="0"/>
+                                  </p:stCondLst>
+                                  <p:childTnLst>
+                                    <p:set>
+                                      <p:cBhvr>
+                                        <p:cTn id="20" dur="1" fill="hold">
+                                          <p:stCondLst>
+                                            <p:cond delay="0"/>
+                                          </p:stCondLst>
+                                        </p:cTn>
+                                        <p:tgtEl>
+                                          <p:spTgt spid="5">
+                                            <p:txEl>
+                                              <p:pRg st="2" end="2"/>
+                                            </p:txEl>
+                                          </p:spTgt>
+                                        </p:tgtEl>
+                                        <p:attrNameLst>
+                                          <p:attrName>style.visibility</p:attrName>
+                                        </p:attrNameLst>
+                                      </p:cBhvr>
+                                      <p:to>
+                                        <p:strVal val="visible"/>
+                                      </p:to>
+                                    </p:set>
+                                  </p:childTnLst>
+                                </p:cTn>
+                              </p:par>
+                            </p:childTnLst>
+                          </p:cTn>
+                        </p:par>
+                      </p:childTnLst>
+                    </p:cTn>
+                  </p:par>
+                  <p:par>
+                    <p:cTn id="21" fill="hold">
+                      <p:stCondLst>
+                        <p:cond delay="indefinite"/>
+                      </p:stCondLst>
+                      <p:childTnLst>
+                        <p:par>
+                          <p:cTn id="22" fill="hold">
+                            <p:stCondLst>
+                              <p:cond delay="0"/>
+                            </p:stCondLst>
+                            <p:childTnLst>
+                              <p:par>
+                                <p:cTn id="23" presetID="1" presetClass="entr" presetSubtype="0" fill="hold" grpId="0" nodeType="clickEffect">
+                                  <p:stCondLst>
+                                    <p:cond delay="0"/>
+                                  </p:stCondLst>
+                                  <p:childTnLst>
+                                    <p:set>
+                                      <p:cBhvr>
+                                        <p:cTn id="24" dur="1" fill="hold">
+                                          <p:stCondLst>
+                                            <p:cond delay="0"/>
+                                          </p:stCondLst>
+                                        </p:cTn>
+                                        <p:tgtEl>
+                                          <p:spTgt spid="5">
+                                            <p:txEl>
+                                              <p:pRg st="3" end="3"/>
+                                            </p:txEl>
+                                          </p:spTgt>
+                                        </p:tgtEl>
+                                        <p:attrNameLst>
+                                          <p:attrName>style.visibility</p:attrName>
+                                        </p:attrNameLst>
+                                      </p:cBhvr>
+                                      <p:to>
+                                        <p:strVal val="visible"/>
+                                      </p:to>
+                                    </p:set>
+                                  </p:childTnLst>
+                                </p:cTn>
+                              </p:par>
+                              <p:par>
+                                <p:cTn id="25" presetID="1" presetClass="entr" presetSubtype="0" fill="hold" nodeType="withEffect">
+                                  <p:stCondLst>
+                                    <p:cond delay="0"/>
+                                  </p:stCondLst>
+                                  <p:childTnLst>
+                                    <p:set>
+                                      <p:cBhvr>
+                                        <p:cTn id="26" dur="1" fill="hold">
+                                          <p:stCondLst>
+                                            <p:cond delay="0"/>
+                                          </p:stCondLst>
+                                        </p:cTn>
+                                        <p:tgtEl>
+                                          <p:spTgt spid="8"/>
+                                        </p:tgtEl>
+                                        <p:attrNameLst>
+                                          <p:attrName>style.visibility</p:attrName>
+                                        </p:attrNameLst>
+                                      </p:cBhvr>
+                                      <p:to>
+                                        <p:strVal val="visible"/>
+                                      </p:to>
+                                    </p:set>
+                                  </p:childTnLst>
+                                </p:cTn>
+                              </p:par>
+                            </p:childTnLst>
+                          </p:cTn>
+                        </p:par>
+                      </p:childTnLst>
+                    </p:cTn>
+                  </p:par>
+                </p:childTnLst>
+              </p:cTn>
+              <p:prevCondLst>
+                <p:cond evt="onPrev" delay="0">
+                  <p:tgtEl>
+                    <p:sldTgt/>
+                  </p:tgtEl>
+                </p:cond>
+              </p:prevCondLst>
+              <p:nextCondLst>
+                <p:cond evt="onNext" delay="0">
+                  <p:tgtEl>
+                    <p:sldTgt/>
+                  </p:tgtEl>
+                </p:cond>
+              </p:nextCondLst>
+            </p:seq>
+          </p:childTnLst>
+        </p:cTn>
       </p:par>
     </p:tnLst>
+    <p:bldLst>
+      <p:bldP spid="2" grpId="0"/>
+      <p:bldP spid="5" grpId="0" build="p"/>
+    </p:bldLst>
   </p:timing>
 </p:sld>
 </file>
@@ -5075,25 +5395,6 @@
           <a:chExt cx="0" cy="0"/>
         </a:xfrm>
       </p:grpSpPr>
-      <p:sp>
-        <p:nvSpPr>
-          <p:cNvPr id="2" name="Title 1"/>
-          <p:cNvSpPr>
-            <a:spLocks noGrp="1"/>
-          </p:cNvSpPr>
-          <p:nvPr>
-            <p:ph type="title"/>
-          </p:nvPr>
-        </p:nvSpPr>
-        <p:spPr/>
-        <p:txBody>
-          <a:bodyPr/>
-          <a:lstStyle/>
-          <a:p>
-            <a:endParaRPr lang="en-GB" dirty="0"/>
-          </a:p>
-        </p:txBody>
-      </p:sp>
       <p:sp>
         <p:nvSpPr>
           <p:cNvPr id="3" name="Content Placeholder 2"/>
@@ -5201,6 +5502,41 @@
           </a:prstGeom>
         </p:spPr>
       </p:pic>
+      <p:sp>
+        <p:nvSpPr>
+          <p:cNvPr id="6" name="Rectangle 5"/>
+          <p:cNvSpPr/>
+          <p:nvPr/>
+        </p:nvSpPr>
+        <p:spPr>
+          <a:xfrm>
+            <a:off x="10016197" y="180459"/>
+            <a:ext cx="2003525" cy="369332"/>
+          </a:xfrm>
+          <a:prstGeom prst="rect">
+            <a:avLst/>
+          </a:prstGeom>
+          <a:ln>
+            <a:solidFill>
+              <a:schemeClr val="accent1"/>
+            </a:solidFill>
+          </a:ln>
+        </p:spPr>
+        <p:txBody>
+          <a:bodyPr wrap="square">
+            <a:spAutoFit/>
+          </a:bodyPr>
+          <a:lstStyle/>
+          <a:p>
+            <a:pPr algn="ctr"/>
+            <a:r>
+              <a:rPr lang="en-US" dirty="0" smtClean="0"/>
+              <a:t>IT14098888</a:t>
+            </a:r>
+            <a:endParaRPr lang="en-US" dirty="0"/>
+          </a:p>
+        </p:txBody>
+      </p:sp>
     </p:spTree>
     <p:extLst>
       <p:ext uri="{BB962C8B-B14F-4D97-AF65-F5344CB8AC3E}">
@@ -5211,10 +5547,1525 @@
   <p:clrMapOvr>
     <a:masterClrMapping/>
   </p:clrMapOvr>
+  <p:timing>
+    <p:tnLst>
+      <p:par>
+        <p:cTn id="1" dur="indefinite" restart="never" nodeType="tmRoot">
+          <p:childTnLst>
+            <p:seq concurrent="1" nextAc="seek">
+              <p:cTn id="2" dur="indefinite" nodeType="mainSeq">
+                <p:childTnLst>
+                  <p:par>
+                    <p:cTn id="3" fill="hold">
+                      <p:stCondLst>
+                        <p:cond delay="indefinite"/>
+                      </p:stCondLst>
+                      <p:childTnLst>
+                        <p:par>
+                          <p:cTn id="4" fill="hold">
+                            <p:stCondLst>
+                              <p:cond delay="0"/>
+                            </p:stCondLst>
+                            <p:childTnLst>
+                              <p:par>
+                                <p:cTn id="5" presetID="10" presetClass="entr" presetSubtype="0" fill="hold" nodeType="clickEffect">
+                                  <p:stCondLst>
+                                    <p:cond delay="0"/>
+                                  </p:stCondLst>
+                                  <p:childTnLst>
+                                    <p:set>
+                                      <p:cBhvr>
+                                        <p:cTn id="6" dur="1" fill="hold">
+                                          <p:stCondLst>
+                                            <p:cond delay="0"/>
+                                          </p:stCondLst>
+                                        </p:cTn>
+                                        <p:tgtEl>
+                                          <p:spTgt spid="4"/>
+                                        </p:tgtEl>
+                                        <p:attrNameLst>
+                                          <p:attrName>style.visibility</p:attrName>
+                                        </p:attrNameLst>
+                                      </p:cBhvr>
+                                      <p:to>
+                                        <p:strVal val="visible"/>
+                                      </p:to>
+                                    </p:set>
+                                    <p:animEffect transition="in" filter="fade">
+                                      <p:cBhvr>
+                                        <p:cTn id="7" dur="500"/>
+                                        <p:tgtEl>
+                                          <p:spTgt spid="4"/>
+                                        </p:tgtEl>
+                                      </p:cBhvr>
+                                    </p:animEffect>
+                                  </p:childTnLst>
+                                </p:cTn>
+                              </p:par>
+                            </p:childTnLst>
+                          </p:cTn>
+                        </p:par>
+                      </p:childTnLst>
+                    </p:cTn>
+                  </p:par>
+                  <p:par>
+                    <p:cTn id="8" fill="hold">
+                      <p:stCondLst>
+                        <p:cond delay="indefinite"/>
+                      </p:stCondLst>
+                      <p:childTnLst>
+                        <p:par>
+                          <p:cTn id="9" fill="hold">
+                            <p:stCondLst>
+                              <p:cond delay="0"/>
+                            </p:stCondLst>
+                            <p:childTnLst>
+                              <p:par>
+                                <p:cTn id="10" presetID="1" presetClass="entr" presetSubtype="0" fill="hold" grpId="0" nodeType="clickEffect">
+                                  <p:stCondLst>
+                                    <p:cond delay="0"/>
+                                  </p:stCondLst>
+                                  <p:childTnLst>
+                                    <p:set>
+                                      <p:cBhvr>
+                                        <p:cTn id="11" dur="1" fill="hold">
+                                          <p:stCondLst>
+                                            <p:cond delay="0"/>
+                                          </p:stCondLst>
+                                        </p:cTn>
+                                        <p:tgtEl>
+                                          <p:spTgt spid="3">
+                                            <p:txEl>
+                                              <p:pRg st="0" end="0"/>
+                                            </p:txEl>
+                                          </p:spTgt>
+                                        </p:tgtEl>
+                                        <p:attrNameLst>
+                                          <p:attrName>style.visibility</p:attrName>
+                                        </p:attrNameLst>
+                                      </p:cBhvr>
+                                      <p:to>
+                                        <p:strVal val="visible"/>
+                                      </p:to>
+                                    </p:set>
+                                  </p:childTnLst>
+                                </p:cTn>
+                              </p:par>
+                            </p:childTnLst>
+                          </p:cTn>
+                        </p:par>
+                      </p:childTnLst>
+                    </p:cTn>
+                  </p:par>
+                  <p:par>
+                    <p:cTn id="12" fill="hold">
+                      <p:stCondLst>
+                        <p:cond delay="indefinite"/>
+                      </p:stCondLst>
+                      <p:childTnLst>
+                        <p:par>
+                          <p:cTn id="13" fill="hold">
+                            <p:stCondLst>
+                              <p:cond delay="0"/>
+                            </p:stCondLst>
+                            <p:childTnLst>
+                              <p:par>
+                                <p:cTn id="14" presetID="1" presetClass="entr" presetSubtype="0" fill="hold" grpId="0" nodeType="clickEffect">
+                                  <p:stCondLst>
+                                    <p:cond delay="0"/>
+                                  </p:stCondLst>
+                                  <p:childTnLst>
+                                    <p:set>
+                                      <p:cBhvr>
+                                        <p:cTn id="15" dur="1" fill="hold">
+                                          <p:stCondLst>
+                                            <p:cond delay="0"/>
+                                          </p:stCondLst>
+                                        </p:cTn>
+                                        <p:tgtEl>
+                                          <p:spTgt spid="3">
+                                            <p:txEl>
+                                              <p:pRg st="1" end="1"/>
+                                            </p:txEl>
+                                          </p:spTgt>
+                                        </p:tgtEl>
+                                        <p:attrNameLst>
+                                          <p:attrName>style.visibility</p:attrName>
+                                        </p:attrNameLst>
+                                      </p:cBhvr>
+                                      <p:to>
+                                        <p:strVal val="visible"/>
+                                      </p:to>
+                                    </p:set>
+                                  </p:childTnLst>
+                                </p:cTn>
+                              </p:par>
+                            </p:childTnLst>
+                          </p:cTn>
+                        </p:par>
+                      </p:childTnLst>
+                    </p:cTn>
+                  </p:par>
+                  <p:par>
+                    <p:cTn id="16" fill="hold">
+                      <p:stCondLst>
+                        <p:cond delay="indefinite"/>
+                      </p:stCondLst>
+                      <p:childTnLst>
+                        <p:par>
+                          <p:cTn id="17" fill="hold">
+                            <p:stCondLst>
+                              <p:cond delay="0"/>
+                            </p:stCondLst>
+                            <p:childTnLst>
+                              <p:par>
+                                <p:cTn id="18" presetID="1" presetClass="entr" presetSubtype="0" fill="hold" grpId="0" nodeType="clickEffect">
+                                  <p:stCondLst>
+                                    <p:cond delay="0"/>
+                                  </p:stCondLst>
+                                  <p:childTnLst>
+                                    <p:set>
+                                      <p:cBhvr>
+                                        <p:cTn id="19" dur="1" fill="hold">
+                                          <p:stCondLst>
+                                            <p:cond delay="0"/>
+                                          </p:stCondLst>
+                                        </p:cTn>
+                                        <p:tgtEl>
+                                          <p:spTgt spid="3">
+                                            <p:txEl>
+                                              <p:pRg st="2" end="2"/>
+                                            </p:txEl>
+                                          </p:spTgt>
+                                        </p:tgtEl>
+                                        <p:attrNameLst>
+                                          <p:attrName>style.visibility</p:attrName>
+                                        </p:attrNameLst>
+                                      </p:cBhvr>
+                                      <p:to>
+                                        <p:strVal val="visible"/>
+                                      </p:to>
+                                    </p:set>
+                                  </p:childTnLst>
+                                </p:cTn>
+                              </p:par>
+                            </p:childTnLst>
+                          </p:cTn>
+                        </p:par>
+                      </p:childTnLst>
+                    </p:cTn>
+                  </p:par>
+                  <p:par>
+                    <p:cTn id="20" fill="hold">
+                      <p:stCondLst>
+                        <p:cond delay="indefinite"/>
+                      </p:stCondLst>
+                      <p:childTnLst>
+                        <p:par>
+                          <p:cTn id="21" fill="hold">
+                            <p:stCondLst>
+                              <p:cond delay="0"/>
+                            </p:stCondLst>
+                            <p:childTnLst>
+                              <p:par>
+                                <p:cTn id="22" presetID="1" presetClass="entr" presetSubtype="0" fill="hold" grpId="0" nodeType="clickEffect">
+                                  <p:stCondLst>
+                                    <p:cond delay="0"/>
+                                  </p:stCondLst>
+                                  <p:childTnLst>
+                                    <p:set>
+                                      <p:cBhvr>
+                                        <p:cTn id="23" dur="1" fill="hold">
+                                          <p:stCondLst>
+                                            <p:cond delay="0"/>
+                                          </p:stCondLst>
+                                        </p:cTn>
+                                        <p:tgtEl>
+                                          <p:spTgt spid="3">
+                                            <p:txEl>
+                                              <p:pRg st="3" end="3"/>
+                                            </p:txEl>
+                                          </p:spTgt>
+                                        </p:tgtEl>
+                                        <p:attrNameLst>
+                                          <p:attrName>style.visibility</p:attrName>
+                                        </p:attrNameLst>
+                                      </p:cBhvr>
+                                      <p:to>
+                                        <p:strVal val="visible"/>
+                                      </p:to>
+                                    </p:set>
+                                  </p:childTnLst>
+                                </p:cTn>
+                              </p:par>
+                            </p:childTnLst>
+                          </p:cTn>
+                        </p:par>
+                      </p:childTnLst>
+                    </p:cTn>
+                  </p:par>
+                  <p:par>
+                    <p:cTn id="24" fill="hold">
+                      <p:stCondLst>
+                        <p:cond delay="indefinite"/>
+                      </p:stCondLst>
+                      <p:childTnLst>
+                        <p:par>
+                          <p:cTn id="25" fill="hold">
+                            <p:stCondLst>
+                              <p:cond delay="0"/>
+                            </p:stCondLst>
+                            <p:childTnLst>
+                              <p:par>
+                                <p:cTn id="26" presetID="1" presetClass="entr" presetSubtype="0" fill="hold" grpId="0" nodeType="clickEffect">
+                                  <p:stCondLst>
+                                    <p:cond delay="0"/>
+                                  </p:stCondLst>
+                                  <p:childTnLst>
+                                    <p:set>
+                                      <p:cBhvr>
+                                        <p:cTn id="27" dur="1" fill="hold">
+                                          <p:stCondLst>
+                                            <p:cond delay="0"/>
+                                          </p:stCondLst>
+                                        </p:cTn>
+                                        <p:tgtEl>
+                                          <p:spTgt spid="3">
+                                            <p:txEl>
+                                              <p:pRg st="4" end="4"/>
+                                            </p:txEl>
+                                          </p:spTgt>
+                                        </p:tgtEl>
+                                        <p:attrNameLst>
+                                          <p:attrName>style.visibility</p:attrName>
+                                        </p:attrNameLst>
+                                      </p:cBhvr>
+                                      <p:to>
+                                        <p:strVal val="visible"/>
+                                      </p:to>
+                                    </p:set>
+                                  </p:childTnLst>
+                                </p:cTn>
+                              </p:par>
+                              <p:par>
+                                <p:cTn id="28" presetID="1" presetClass="entr" presetSubtype="0" fill="hold" nodeType="withEffect">
+                                  <p:stCondLst>
+                                    <p:cond delay="0"/>
+                                  </p:stCondLst>
+                                  <p:childTnLst>
+                                    <p:set>
+                                      <p:cBhvr>
+                                        <p:cTn id="29" dur="1" fill="hold">
+                                          <p:stCondLst>
+                                            <p:cond delay="0"/>
+                                          </p:stCondLst>
+                                        </p:cTn>
+                                        <p:tgtEl>
+                                          <p:spTgt spid="5"/>
+                                        </p:tgtEl>
+                                        <p:attrNameLst>
+                                          <p:attrName>style.visibility</p:attrName>
+                                        </p:attrNameLst>
+                                      </p:cBhvr>
+                                      <p:to>
+                                        <p:strVal val="visible"/>
+                                      </p:to>
+                                    </p:set>
+                                  </p:childTnLst>
+                                </p:cTn>
+                              </p:par>
+                            </p:childTnLst>
+                          </p:cTn>
+                        </p:par>
+                      </p:childTnLst>
+                    </p:cTn>
+                  </p:par>
+                </p:childTnLst>
+              </p:cTn>
+              <p:prevCondLst>
+                <p:cond evt="onPrev" delay="0">
+                  <p:tgtEl>
+                    <p:sldTgt/>
+                  </p:tgtEl>
+                </p:cond>
+              </p:prevCondLst>
+              <p:nextCondLst>
+                <p:cond evt="onNext" delay="0">
+                  <p:tgtEl>
+                    <p:sldTgt/>
+                  </p:tgtEl>
+                </p:cond>
+              </p:nextCondLst>
+            </p:seq>
+          </p:childTnLst>
+        </p:cTn>
+      </p:par>
+    </p:tnLst>
+    <p:bldLst>
+      <p:bldP spid="3" grpId="0" build="p"/>
+    </p:bldLst>
+  </p:timing>
 </p:sld>
 </file>
 
 <file path=ppt/slides/slide6.xml><?xml version="1.0" encoding="utf-8"?>
+<p:sld xmlns:a="http://schemas.openxmlformats.org/drawingml/2006/main" xmlns:r="http://schemas.openxmlformats.org/officeDocument/2006/relationships" xmlns:p="http://schemas.openxmlformats.org/presentationml/2006/main">
+  <p:cSld>
+    <p:spTree>
+      <p:nvGrpSpPr>
+        <p:cNvPr id="1" name=""/>
+        <p:cNvGrpSpPr/>
+        <p:nvPr/>
+      </p:nvGrpSpPr>
+      <p:grpSpPr>
+        <a:xfrm>
+          <a:off x="0" y="0"/>
+          <a:ext cx="0" cy="0"/>
+          <a:chOff x="0" y="0"/>
+          <a:chExt cx="0" cy="0"/>
+        </a:xfrm>
+      </p:grpSpPr>
+      <p:sp>
+        <p:nvSpPr>
+          <p:cNvPr id="3" name="Content Placeholder 2"/>
+          <p:cNvSpPr>
+            <a:spLocks noGrp="1"/>
+          </p:cNvSpPr>
+          <p:nvPr>
+            <p:ph idx="1"/>
+          </p:nvPr>
+        </p:nvSpPr>
+        <p:spPr>
+          <a:xfrm>
+            <a:off x="838200" y="570834"/>
+            <a:ext cx="10515600" cy="5606129"/>
+          </a:xfrm>
+        </p:spPr>
+        <p:txBody>
+          <a:bodyPr/>
+          <a:lstStyle/>
+          <a:p>
+            <a:r>
+              <a:rPr lang="en-IN" dirty="0" smtClean="0"/>
+              <a:t>FIFA World Cup in 2010.</a:t>
+            </a:r>
+          </a:p>
+          <a:p>
+            <a:r>
+              <a:rPr lang="en-IN" dirty="0" smtClean="0"/>
+              <a:t>2940 tweets were posted per second in the 30 second period of time.</a:t>
+            </a:r>
+          </a:p>
+          <a:p>
+            <a:r>
+              <a:rPr lang="en-IN" dirty="0" smtClean="0"/>
+              <a:t>Official football club accounts established in 2011.</a:t>
+            </a:r>
+          </a:p>
+          <a:p>
+            <a:r>
+              <a:rPr lang="en-IN" dirty="0" smtClean="0"/>
+              <a:t>In 2012 – Nielsen and Twitter entered a multi- year agreement.</a:t>
+            </a:r>
+          </a:p>
+          <a:p>
+            <a:r>
+              <a:rPr lang="en-IN" dirty="0" smtClean="0"/>
+              <a:t>Nielsen Twitter TV Rating to produce social TV ratings.</a:t>
+            </a:r>
+          </a:p>
+          <a:p>
+            <a:r>
+              <a:rPr lang="en-IN" dirty="0" smtClean="0"/>
+              <a:t>Because of real time news feeds.</a:t>
+            </a:r>
+          </a:p>
+          <a:p>
+            <a:endParaRPr lang="en-IN" dirty="0" smtClean="0"/>
+          </a:p>
+          <a:p>
+            <a:r>
+              <a:rPr lang="en-IN" dirty="0" smtClean="0"/>
+              <a:t>One of the top ten most visited websites in 2013.</a:t>
+            </a:r>
+          </a:p>
+          <a:p>
+            <a:r>
+              <a:rPr lang="en-IN" dirty="0" smtClean="0"/>
+              <a:t>At least 5% accounts on Twitter are fraudulent – Twitterbots.</a:t>
+            </a:r>
+          </a:p>
+          <a:p>
+            <a:pPr marL="0" indent="0">
+              <a:buNone/>
+            </a:pPr>
+            <a:endParaRPr lang="en-GB" dirty="0"/>
+          </a:p>
+        </p:txBody>
+      </p:sp>
+      <p:pic>
+        <p:nvPicPr>
+          <p:cNvPr id="4" name="Content Placeholder 3"/>
+          <p:cNvPicPr>
+            <a:picLocks noChangeAspect="1"/>
+          </p:cNvPicPr>
+          <p:nvPr/>
+        </p:nvPicPr>
+        <p:blipFill>
+          <a:blip r:embed="rId2" cstate="print">
+            <a:extLst>
+              <a:ext uri="{28A0092B-C50C-407E-A947-70E740481C1C}">
+                <a14:useLocalDpi xmlns:a14="http://schemas.microsoft.com/office/drawing/2010/main" val="0"/>
+              </a:ext>
+            </a:extLst>
+          </a:blip>
+          <a:stretch>
+            <a:fillRect/>
+          </a:stretch>
+        </p:blipFill>
+        <p:spPr>
+          <a:xfrm>
+            <a:off x="4922924" y="113762"/>
+            <a:ext cx="914143" cy="914143"/>
+          </a:xfrm>
+          <a:prstGeom prst="rect">
+            <a:avLst/>
+          </a:prstGeom>
+        </p:spPr>
+      </p:pic>
+      <p:pic>
+        <p:nvPicPr>
+          <p:cNvPr id="5" name="Picture 4"/>
+          <p:cNvPicPr>
+            <a:picLocks noChangeAspect="1"/>
+          </p:cNvPicPr>
+          <p:nvPr/>
+        </p:nvPicPr>
+        <p:blipFill>
+          <a:blip r:embed="rId3">
+            <a:extLst>
+              <a:ext uri="{28A0092B-C50C-407E-A947-70E740481C1C}">
+                <a14:useLocalDpi xmlns:a14="http://schemas.microsoft.com/office/drawing/2010/main" val="0"/>
+              </a:ext>
+            </a:extLst>
+          </a:blip>
+          <a:stretch>
+            <a:fillRect/>
+          </a:stretch>
+        </p:blipFill>
+        <p:spPr>
+          <a:xfrm>
+            <a:off x="8229185" y="3139982"/>
+            <a:ext cx="1081669" cy="879125"/>
+          </a:xfrm>
+          <a:prstGeom prst="rect">
+            <a:avLst/>
+          </a:prstGeom>
+        </p:spPr>
+      </p:pic>
+      <p:sp>
+        <p:nvSpPr>
+          <p:cNvPr id="6" name="Rectangle 5"/>
+          <p:cNvSpPr/>
+          <p:nvPr/>
+        </p:nvSpPr>
+        <p:spPr>
+          <a:xfrm>
+            <a:off x="10016197" y="180459"/>
+            <a:ext cx="2003525" cy="369332"/>
+          </a:xfrm>
+          <a:prstGeom prst="rect">
+            <a:avLst/>
+          </a:prstGeom>
+          <a:ln>
+            <a:solidFill>
+              <a:schemeClr val="accent1"/>
+            </a:solidFill>
+          </a:ln>
+        </p:spPr>
+        <p:txBody>
+          <a:bodyPr wrap="square">
+            <a:spAutoFit/>
+          </a:bodyPr>
+          <a:lstStyle/>
+          <a:p>
+            <a:pPr algn="ctr"/>
+            <a:r>
+              <a:rPr lang="en-US" dirty="0" smtClean="0"/>
+              <a:t>IT14098888</a:t>
+            </a:r>
+            <a:endParaRPr lang="en-US" dirty="0"/>
+          </a:p>
+        </p:txBody>
+      </p:sp>
+    </p:spTree>
+    <p:extLst>
+      <p:ext uri="{BB962C8B-B14F-4D97-AF65-F5344CB8AC3E}">
+        <p14:creationId xmlns:p14="http://schemas.microsoft.com/office/powerpoint/2010/main" val="2142761057"/>
+      </p:ext>
+    </p:extLst>
+  </p:cSld>
+  <p:clrMapOvr>
+    <a:masterClrMapping/>
+  </p:clrMapOvr>
+  <p:timing>
+    <p:tnLst>
+      <p:par>
+        <p:cTn id="1" dur="indefinite" restart="never" nodeType="tmRoot">
+          <p:childTnLst>
+            <p:seq concurrent="1" nextAc="seek">
+              <p:cTn id="2" dur="indefinite" nodeType="mainSeq">
+                <p:childTnLst>
+                  <p:par>
+                    <p:cTn id="3" fill="hold">
+                      <p:stCondLst>
+                        <p:cond delay="indefinite"/>
+                      </p:stCondLst>
+                      <p:childTnLst>
+                        <p:par>
+                          <p:cTn id="4" fill="hold">
+                            <p:stCondLst>
+                              <p:cond delay="0"/>
+                            </p:stCondLst>
+                            <p:childTnLst>
+                              <p:par>
+                                <p:cTn id="5" presetID="1" presetClass="entr" presetSubtype="0" fill="hold" nodeType="clickEffect">
+                                  <p:stCondLst>
+                                    <p:cond delay="0"/>
+                                  </p:stCondLst>
+                                  <p:childTnLst>
+                                    <p:set>
+                                      <p:cBhvr>
+                                        <p:cTn id="6" dur="1" fill="hold">
+                                          <p:stCondLst>
+                                            <p:cond delay="0"/>
+                                          </p:stCondLst>
+                                        </p:cTn>
+                                        <p:tgtEl>
+                                          <p:spTgt spid="4"/>
+                                        </p:tgtEl>
+                                        <p:attrNameLst>
+                                          <p:attrName>style.visibility</p:attrName>
+                                        </p:attrNameLst>
+                                      </p:cBhvr>
+                                      <p:to>
+                                        <p:strVal val="visible"/>
+                                      </p:to>
+                                    </p:set>
+                                  </p:childTnLst>
+                                </p:cTn>
+                              </p:par>
+                            </p:childTnLst>
+                          </p:cTn>
+                        </p:par>
+                      </p:childTnLst>
+                    </p:cTn>
+                  </p:par>
+                  <p:par>
+                    <p:cTn id="7" fill="hold">
+                      <p:stCondLst>
+                        <p:cond delay="indefinite"/>
+                      </p:stCondLst>
+                      <p:childTnLst>
+                        <p:par>
+                          <p:cTn id="8" fill="hold">
+                            <p:stCondLst>
+                              <p:cond delay="0"/>
+                            </p:stCondLst>
+                            <p:childTnLst>
+                              <p:par>
+                                <p:cTn id="9" presetID="1" presetClass="entr" presetSubtype="0" fill="hold" nodeType="clickEffect">
+                                  <p:stCondLst>
+                                    <p:cond delay="0"/>
+                                  </p:stCondLst>
+                                  <p:childTnLst>
+                                    <p:set>
+                                      <p:cBhvr>
+                                        <p:cTn id="10" dur="1" fill="hold">
+                                          <p:stCondLst>
+                                            <p:cond delay="0"/>
+                                          </p:stCondLst>
+                                        </p:cTn>
+                                        <p:tgtEl>
+                                          <p:spTgt spid="3">
+                                            <p:txEl>
+                                              <p:pRg st="0" end="0"/>
+                                            </p:txEl>
+                                          </p:spTgt>
+                                        </p:tgtEl>
+                                        <p:attrNameLst>
+                                          <p:attrName>style.visibility</p:attrName>
+                                        </p:attrNameLst>
+                                      </p:cBhvr>
+                                      <p:to>
+                                        <p:strVal val="visible"/>
+                                      </p:to>
+                                    </p:set>
+                                  </p:childTnLst>
+                                </p:cTn>
+                              </p:par>
+                            </p:childTnLst>
+                          </p:cTn>
+                        </p:par>
+                      </p:childTnLst>
+                    </p:cTn>
+                  </p:par>
+                  <p:par>
+                    <p:cTn id="11" fill="hold">
+                      <p:stCondLst>
+                        <p:cond delay="indefinite"/>
+                      </p:stCondLst>
+                      <p:childTnLst>
+                        <p:par>
+                          <p:cTn id="12" fill="hold">
+                            <p:stCondLst>
+                              <p:cond delay="0"/>
+                            </p:stCondLst>
+                            <p:childTnLst>
+                              <p:par>
+                                <p:cTn id="13" presetID="1" presetClass="entr" presetSubtype="0" fill="hold" nodeType="clickEffect">
+                                  <p:stCondLst>
+                                    <p:cond delay="0"/>
+                                  </p:stCondLst>
+                                  <p:childTnLst>
+                                    <p:set>
+                                      <p:cBhvr>
+                                        <p:cTn id="14" dur="1" fill="hold">
+                                          <p:stCondLst>
+                                            <p:cond delay="0"/>
+                                          </p:stCondLst>
+                                        </p:cTn>
+                                        <p:tgtEl>
+                                          <p:spTgt spid="3">
+                                            <p:txEl>
+                                              <p:pRg st="1" end="1"/>
+                                            </p:txEl>
+                                          </p:spTgt>
+                                        </p:tgtEl>
+                                        <p:attrNameLst>
+                                          <p:attrName>style.visibility</p:attrName>
+                                        </p:attrNameLst>
+                                      </p:cBhvr>
+                                      <p:to>
+                                        <p:strVal val="visible"/>
+                                      </p:to>
+                                    </p:set>
+                                  </p:childTnLst>
+                                </p:cTn>
+                              </p:par>
+                            </p:childTnLst>
+                          </p:cTn>
+                        </p:par>
+                      </p:childTnLst>
+                    </p:cTn>
+                  </p:par>
+                  <p:par>
+                    <p:cTn id="15" fill="hold">
+                      <p:stCondLst>
+                        <p:cond delay="indefinite"/>
+                      </p:stCondLst>
+                      <p:childTnLst>
+                        <p:par>
+                          <p:cTn id="16" fill="hold">
+                            <p:stCondLst>
+                              <p:cond delay="0"/>
+                            </p:stCondLst>
+                            <p:childTnLst>
+                              <p:par>
+                                <p:cTn id="17" presetID="1" presetClass="entr" presetSubtype="0" fill="hold" nodeType="clickEffect">
+                                  <p:stCondLst>
+                                    <p:cond delay="0"/>
+                                  </p:stCondLst>
+                                  <p:childTnLst>
+                                    <p:set>
+                                      <p:cBhvr>
+                                        <p:cTn id="18" dur="1" fill="hold">
+                                          <p:stCondLst>
+                                            <p:cond delay="0"/>
+                                          </p:stCondLst>
+                                        </p:cTn>
+                                        <p:tgtEl>
+                                          <p:spTgt spid="3">
+                                            <p:txEl>
+                                              <p:pRg st="2" end="2"/>
+                                            </p:txEl>
+                                          </p:spTgt>
+                                        </p:tgtEl>
+                                        <p:attrNameLst>
+                                          <p:attrName>style.visibility</p:attrName>
+                                        </p:attrNameLst>
+                                      </p:cBhvr>
+                                      <p:to>
+                                        <p:strVal val="visible"/>
+                                      </p:to>
+                                    </p:set>
+                                  </p:childTnLst>
+                                </p:cTn>
+                              </p:par>
+                            </p:childTnLst>
+                          </p:cTn>
+                        </p:par>
+                      </p:childTnLst>
+                    </p:cTn>
+                  </p:par>
+                  <p:par>
+                    <p:cTn id="19" fill="hold">
+                      <p:stCondLst>
+                        <p:cond delay="indefinite"/>
+                      </p:stCondLst>
+                      <p:childTnLst>
+                        <p:par>
+                          <p:cTn id="20" fill="hold">
+                            <p:stCondLst>
+                              <p:cond delay="0"/>
+                            </p:stCondLst>
+                            <p:childTnLst>
+                              <p:par>
+                                <p:cTn id="21" presetID="1" presetClass="entr" presetSubtype="0" fill="hold" nodeType="clickEffect">
+                                  <p:stCondLst>
+                                    <p:cond delay="0"/>
+                                  </p:stCondLst>
+                                  <p:childTnLst>
+                                    <p:set>
+                                      <p:cBhvr>
+                                        <p:cTn id="22" dur="1" fill="hold">
+                                          <p:stCondLst>
+                                            <p:cond delay="0"/>
+                                          </p:stCondLst>
+                                        </p:cTn>
+                                        <p:tgtEl>
+                                          <p:spTgt spid="5"/>
+                                        </p:tgtEl>
+                                        <p:attrNameLst>
+                                          <p:attrName>style.visibility</p:attrName>
+                                        </p:attrNameLst>
+                                      </p:cBhvr>
+                                      <p:to>
+                                        <p:strVal val="visible"/>
+                                      </p:to>
+                                    </p:set>
+                                  </p:childTnLst>
+                                </p:cTn>
+                              </p:par>
+                            </p:childTnLst>
+                          </p:cTn>
+                        </p:par>
+                      </p:childTnLst>
+                    </p:cTn>
+                  </p:par>
+                  <p:par>
+                    <p:cTn id="23" fill="hold">
+                      <p:stCondLst>
+                        <p:cond delay="indefinite"/>
+                      </p:stCondLst>
+                      <p:childTnLst>
+                        <p:par>
+                          <p:cTn id="24" fill="hold">
+                            <p:stCondLst>
+                              <p:cond delay="0"/>
+                            </p:stCondLst>
+                            <p:childTnLst>
+                              <p:par>
+                                <p:cTn id="25" presetID="1" presetClass="entr" presetSubtype="0" fill="hold" nodeType="clickEffect">
+                                  <p:stCondLst>
+                                    <p:cond delay="0"/>
+                                  </p:stCondLst>
+                                  <p:childTnLst>
+                                    <p:set>
+                                      <p:cBhvr>
+                                        <p:cTn id="26" dur="1" fill="hold">
+                                          <p:stCondLst>
+                                            <p:cond delay="0"/>
+                                          </p:stCondLst>
+                                        </p:cTn>
+                                        <p:tgtEl>
+                                          <p:spTgt spid="3">
+                                            <p:txEl>
+                                              <p:pRg st="3" end="3"/>
+                                            </p:txEl>
+                                          </p:spTgt>
+                                        </p:tgtEl>
+                                        <p:attrNameLst>
+                                          <p:attrName>style.visibility</p:attrName>
+                                        </p:attrNameLst>
+                                      </p:cBhvr>
+                                      <p:to>
+                                        <p:strVal val="visible"/>
+                                      </p:to>
+                                    </p:set>
+                                  </p:childTnLst>
+                                </p:cTn>
+                              </p:par>
+                            </p:childTnLst>
+                          </p:cTn>
+                        </p:par>
+                      </p:childTnLst>
+                    </p:cTn>
+                  </p:par>
+                  <p:par>
+                    <p:cTn id="27" fill="hold">
+                      <p:stCondLst>
+                        <p:cond delay="indefinite"/>
+                      </p:stCondLst>
+                      <p:childTnLst>
+                        <p:par>
+                          <p:cTn id="28" fill="hold">
+                            <p:stCondLst>
+                              <p:cond delay="0"/>
+                            </p:stCondLst>
+                            <p:childTnLst>
+                              <p:par>
+                                <p:cTn id="29" presetID="1" presetClass="entr" presetSubtype="0" fill="hold" nodeType="clickEffect">
+                                  <p:stCondLst>
+                                    <p:cond delay="0"/>
+                                  </p:stCondLst>
+                                  <p:childTnLst>
+                                    <p:set>
+                                      <p:cBhvr>
+                                        <p:cTn id="30" dur="1" fill="hold">
+                                          <p:stCondLst>
+                                            <p:cond delay="0"/>
+                                          </p:stCondLst>
+                                        </p:cTn>
+                                        <p:tgtEl>
+                                          <p:spTgt spid="3">
+                                            <p:txEl>
+                                              <p:pRg st="4" end="4"/>
+                                            </p:txEl>
+                                          </p:spTgt>
+                                        </p:tgtEl>
+                                        <p:attrNameLst>
+                                          <p:attrName>style.visibility</p:attrName>
+                                        </p:attrNameLst>
+                                      </p:cBhvr>
+                                      <p:to>
+                                        <p:strVal val="visible"/>
+                                      </p:to>
+                                    </p:set>
+                                  </p:childTnLst>
+                                </p:cTn>
+                              </p:par>
+                              <p:par>
+                                <p:cTn id="31" presetID="1" presetClass="entr" presetSubtype="0" fill="hold" nodeType="withEffect">
+                                  <p:stCondLst>
+                                    <p:cond delay="0"/>
+                                  </p:stCondLst>
+                                  <p:childTnLst>
+                                    <p:set>
+                                      <p:cBhvr>
+                                        <p:cTn id="32" dur="1" fill="hold">
+                                          <p:stCondLst>
+                                            <p:cond delay="0"/>
+                                          </p:stCondLst>
+                                        </p:cTn>
+                                        <p:tgtEl>
+                                          <p:spTgt spid="3">
+                                            <p:txEl>
+                                              <p:pRg st="5" end="5"/>
+                                            </p:txEl>
+                                          </p:spTgt>
+                                        </p:tgtEl>
+                                        <p:attrNameLst>
+                                          <p:attrName>style.visibility</p:attrName>
+                                        </p:attrNameLst>
+                                      </p:cBhvr>
+                                      <p:to>
+                                        <p:strVal val="visible"/>
+                                      </p:to>
+                                    </p:set>
+                                  </p:childTnLst>
+                                </p:cTn>
+                              </p:par>
+                            </p:childTnLst>
+                          </p:cTn>
+                        </p:par>
+                      </p:childTnLst>
+                    </p:cTn>
+                  </p:par>
+                  <p:par>
+                    <p:cTn id="33" fill="hold">
+                      <p:stCondLst>
+                        <p:cond delay="indefinite"/>
+                      </p:stCondLst>
+                      <p:childTnLst>
+                        <p:par>
+                          <p:cTn id="34" fill="hold">
+                            <p:stCondLst>
+                              <p:cond delay="0"/>
+                            </p:stCondLst>
+                            <p:childTnLst>
+                              <p:par>
+                                <p:cTn id="35" presetID="1" presetClass="entr" presetSubtype="0" fill="hold" nodeType="clickEffect">
+                                  <p:stCondLst>
+                                    <p:cond delay="0"/>
+                                  </p:stCondLst>
+                                  <p:childTnLst>
+                                    <p:set>
+                                      <p:cBhvr>
+                                        <p:cTn id="36" dur="1" fill="hold">
+                                          <p:stCondLst>
+                                            <p:cond delay="0"/>
+                                          </p:stCondLst>
+                                        </p:cTn>
+                                        <p:tgtEl>
+                                          <p:spTgt spid="3">
+                                            <p:txEl>
+                                              <p:pRg st="7" end="7"/>
+                                            </p:txEl>
+                                          </p:spTgt>
+                                        </p:tgtEl>
+                                        <p:attrNameLst>
+                                          <p:attrName>style.visibility</p:attrName>
+                                        </p:attrNameLst>
+                                      </p:cBhvr>
+                                      <p:to>
+                                        <p:strVal val="visible"/>
+                                      </p:to>
+                                    </p:set>
+                                  </p:childTnLst>
+                                </p:cTn>
+                              </p:par>
+                            </p:childTnLst>
+                          </p:cTn>
+                        </p:par>
+                      </p:childTnLst>
+                    </p:cTn>
+                  </p:par>
+                  <p:par>
+                    <p:cTn id="37" fill="hold">
+                      <p:stCondLst>
+                        <p:cond delay="indefinite"/>
+                      </p:stCondLst>
+                      <p:childTnLst>
+                        <p:par>
+                          <p:cTn id="38" fill="hold">
+                            <p:stCondLst>
+                              <p:cond delay="0"/>
+                            </p:stCondLst>
+                            <p:childTnLst>
+                              <p:par>
+                                <p:cTn id="39" presetID="1" presetClass="entr" presetSubtype="0" fill="hold" nodeType="clickEffect">
+                                  <p:stCondLst>
+                                    <p:cond delay="0"/>
+                                  </p:stCondLst>
+                                  <p:childTnLst>
+                                    <p:set>
+                                      <p:cBhvr>
+                                        <p:cTn id="40" dur="1" fill="hold">
+                                          <p:stCondLst>
+                                            <p:cond delay="0"/>
+                                          </p:stCondLst>
+                                        </p:cTn>
+                                        <p:tgtEl>
+                                          <p:spTgt spid="3">
+                                            <p:txEl>
+                                              <p:pRg st="8" end="8"/>
+                                            </p:txEl>
+                                          </p:spTgt>
+                                        </p:tgtEl>
+                                        <p:attrNameLst>
+                                          <p:attrName>style.visibility</p:attrName>
+                                        </p:attrNameLst>
+                                      </p:cBhvr>
+                                      <p:to>
+                                        <p:strVal val="visible"/>
+                                      </p:to>
+                                    </p:set>
+                                  </p:childTnLst>
+                                </p:cTn>
+                              </p:par>
+                            </p:childTnLst>
+                          </p:cTn>
+                        </p:par>
+                      </p:childTnLst>
+                    </p:cTn>
+                  </p:par>
+                </p:childTnLst>
+              </p:cTn>
+              <p:prevCondLst>
+                <p:cond evt="onPrev" delay="0">
+                  <p:tgtEl>
+                    <p:sldTgt/>
+                  </p:tgtEl>
+                </p:cond>
+              </p:prevCondLst>
+              <p:nextCondLst>
+                <p:cond evt="onNext" delay="0">
+                  <p:tgtEl>
+                    <p:sldTgt/>
+                  </p:tgtEl>
+                </p:cond>
+              </p:nextCondLst>
+            </p:seq>
+          </p:childTnLst>
+        </p:cTn>
+      </p:par>
+    </p:tnLst>
+  </p:timing>
+</p:sld>
+</file>
+
+<file path=ppt/slides/slide7.xml><?xml version="1.0" encoding="utf-8"?>
+<p:sld xmlns:a="http://schemas.openxmlformats.org/drawingml/2006/main" xmlns:r="http://schemas.openxmlformats.org/officeDocument/2006/relationships" xmlns:p="http://schemas.openxmlformats.org/presentationml/2006/main">
+  <p:cSld>
+    <p:spTree>
+      <p:nvGrpSpPr>
+        <p:cNvPr id="1" name=""/>
+        <p:cNvGrpSpPr/>
+        <p:nvPr/>
+      </p:nvGrpSpPr>
+      <p:grpSpPr>
+        <a:xfrm>
+          <a:off x="0" y="0"/>
+          <a:ext cx="0" cy="0"/>
+          <a:chOff x="0" y="0"/>
+          <a:chExt cx="0" cy="0"/>
+        </a:xfrm>
+      </p:grpSpPr>
+      <p:sp>
+        <p:nvSpPr>
+          <p:cNvPr id="3" name="Content Placeholder 2"/>
+          <p:cNvSpPr>
+            <a:spLocks noGrp="1"/>
+          </p:cNvSpPr>
+          <p:nvPr>
+            <p:ph idx="1"/>
+          </p:nvPr>
+        </p:nvSpPr>
+        <p:spPr/>
+        <p:txBody>
+          <a:bodyPr/>
+          <a:lstStyle/>
+          <a:p>
+            <a:r>
+              <a:rPr lang="en-IN" dirty="0" smtClean="0"/>
+              <a:t>2014 – new connection with IBM to improve customer interaction.</a:t>
+            </a:r>
+          </a:p>
+          <a:p>
+            <a:r>
+              <a:rPr lang="en-IN" dirty="0" smtClean="0"/>
+              <a:t>TweetDeck – share team accounts.</a:t>
+            </a:r>
+          </a:p>
+          <a:p>
+            <a:r>
+              <a:rPr lang="en-IN" dirty="0" smtClean="0"/>
+              <a:t>No need to share passwords.</a:t>
+            </a:r>
+          </a:p>
+          <a:p>
+            <a:r>
+              <a:rPr lang="en-IN" dirty="0" smtClean="0"/>
+              <a:t>40 million election related tweets– 2016.</a:t>
+            </a:r>
+          </a:p>
+          <a:p>
+            <a:r>
+              <a:rPr lang="en-IN" dirty="0" smtClean="0"/>
+              <a:t>Twitter Lite introduced recently.</a:t>
+            </a:r>
+          </a:p>
+          <a:p>
+            <a:endParaRPr lang="en-IN" dirty="0" smtClean="0"/>
+          </a:p>
+          <a:p>
+            <a:endParaRPr lang="en-IN" dirty="0" smtClean="0"/>
+          </a:p>
+          <a:p>
+            <a:endParaRPr lang="en-GB" dirty="0"/>
+          </a:p>
+        </p:txBody>
+      </p:sp>
+      <p:pic>
+        <p:nvPicPr>
+          <p:cNvPr id="4" name="Picture 3"/>
+          <p:cNvPicPr>
+            <a:picLocks noChangeAspect="1"/>
+          </p:cNvPicPr>
+          <p:nvPr/>
+        </p:nvPicPr>
+        <p:blipFill>
+          <a:blip r:embed="rId2">
+            <a:extLst>
+              <a:ext uri="{28A0092B-C50C-407E-A947-70E740481C1C}">
+                <a14:useLocalDpi xmlns:a14="http://schemas.microsoft.com/office/drawing/2010/main" val="0"/>
+              </a:ext>
+            </a:extLst>
+          </a:blip>
+          <a:stretch>
+            <a:fillRect/>
+          </a:stretch>
+        </p:blipFill>
+        <p:spPr>
+          <a:xfrm>
+            <a:off x="5555165" y="588343"/>
+            <a:ext cx="1081669" cy="879125"/>
+          </a:xfrm>
+          <a:prstGeom prst="rect">
+            <a:avLst/>
+          </a:prstGeom>
+        </p:spPr>
+      </p:pic>
+      <p:sp>
+        <p:nvSpPr>
+          <p:cNvPr id="5" name="Rectangle 4"/>
+          <p:cNvSpPr/>
+          <p:nvPr/>
+        </p:nvSpPr>
+        <p:spPr>
+          <a:xfrm>
+            <a:off x="10016197" y="180459"/>
+            <a:ext cx="2003525" cy="369332"/>
+          </a:xfrm>
+          <a:prstGeom prst="rect">
+            <a:avLst/>
+          </a:prstGeom>
+          <a:ln>
+            <a:solidFill>
+              <a:schemeClr val="accent1"/>
+            </a:solidFill>
+          </a:ln>
+        </p:spPr>
+        <p:txBody>
+          <a:bodyPr wrap="square">
+            <a:spAutoFit/>
+          </a:bodyPr>
+          <a:lstStyle/>
+          <a:p>
+            <a:pPr algn="ctr"/>
+            <a:r>
+              <a:rPr lang="en-US" dirty="0" smtClean="0"/>
+              <a:t>IT14098888</a:t>
+            </a:r>
+            <a:endParaRPr lang="en-US" dirty="0"/>
+          </a:p>
+        </p:txBody>
+      </p:sp>
+    </p:spTree>
+    <p:extLst>
+      <p:ext uri="{BB962C8B-B14F-4D97-AF65-F5344CB8AC3E}">
+        <p14:creationId xmlns:p14="http://schemas.microsoft.com/office/powerpoint/2010/main" val="74297017"/>
+      </p:ext>
+    </p:extLst>
+  </p:cSld>
+  <p:clrMapOvr>
+    <a:masterClrMapping/>
+  </p:clrMapOvr>
+  <p:timing>
+    <p:tnLst>
+      <p:par>
+        <p:cTn id="1" dur="indefinite" restart="never" nodeType="tmRoot">
+          <p:childTnLst>
+            <p:seq concurrent="1" nextAc="seek">
+              <p:cTn id="2" dur="indefinite" nodeType="mainSeq">
+                <p:childTnLst>
+                  <p:par>
+                    <p:cTn id="3" fill="hold">
+                      <p:stCondLst>
+                        <p:cond delay="indefinite"/>
+                      </p:stCondLst>
+                      <p:childTnLst>
+                        <p:par>
+                          <p:cTn id="4" fill="hold">
+                            <p:stCondLst>
+                              <p:cond delay="0"/>
+                            </p:stCondLst>
+                            <p:childTnLst>
+                              <p:par>
+                                <p:cTn id="5" presetID="10" presetClass="entr" presetSubtype="0" fill="hold" nodeType="clickEffect">
+                                  <p:stCondLst>
+                                    <p:cond delay="0"/>
+                                  </p:stCondLst>
+                                  <p:childTnLst>
+                                    <p:set>
+                                      <p:cBhvr>
+                                        <p:cTn id="6" dur="1" fill="hold">
+                                          <p:stCondLst>
+                                            <p:cond delay="0"/>
+                                          </p:stCondLst>
+                                        </p:cTn>
+                                        <p:tgtEl>
+                                          <p:spTgt spid="4"/>
+                                        </p:tgtEl>
+                                        <p:attrNameLst>
+                                          <p:attrName>style.visibility</p:attrName>
+                                        </p:attrNameLst>
+                                      </p:cBhvr>
+                                      <p:to>
+                                        <p:strVal val="visible"/>
+                                      </p:to>
+                                    </p:set>
+                                    <p:animEffect transition="in" filter="fade">
+                                      <p:cBhvr>
+                                        <p:cTn id="7" dur="500"/>
+                                        <p:tgtEl>
+                                          <p:spTgt spid="4"/>
+                                        </p:tgtEl>
+                                      </p:cBhvr>
+                                    </p:animEffect>
+                                  </p:childTnLst>
+                                </p:cTn>
+                              </p:par>
+                            </p:childTnLst>
+                          </p:cTn>
+                        </p:par>
+                      </p:childTnLst>
+                    </p:cTn>
+                  </p:par>
+                  <p:par>
+                    <p:cTn id="8" fill="hold">
+                      <p:stCondLst>
+                        <p:cond delay="indefinite"/>
+                      </p:stCondLst>
+                      <p:childTnLst>
+                        <p:par>
+                          <p:cTn id="9" fill="hold">
+                            <p:stCondLst>
+                              <p:cond delay="0"/>
+                            </p:stCondLst>
+                            <p:childTnLst>
+                              <p:par>
+                                <p:cTn id="10" presetID="1" presetClass="entr" presetSubtype="0" fill="hold" nodeType="clickEffect">
+                                  <p:stCondLst>
+                                    <p:cond delay="0"/>
+                                  </p:stCondLst>
+                                  <p:childTnLst>
+                                    <p:set>
+                                      <p:cBhvr>
+                                        <p:cTn id="11" dur="1" fill="hold">
+                                          <p:stCondLst>
+                                            <p:cond delay="0"/>
+                                          </p:stCondLst>
+                                        </p:cTn>
+                                        <p:tgtEl>
+                                          <p:spTgt spid="3">
+                                            <p:txEl>
+                                              <p:pRg st="0" end="0"/>
+                                            </p:txEl>
+                                          </p:spTgt>
+                                        </p:tgtEl>
+                                        <p:attrNameLst>
+                                          <p:attrName>style.visibility</p:attrName>
+                                        </p:attrNameLst>
+                                      </p:cBhvr>
+                                      <p:to>
+                                        <p:strVal val="visible"/>
+                                      </p:to>
+                                    </p:set>
+                                  </p:childTnLst>
+                                </p:cTn>
+                              </p:par>
+                            </p:childTnLst>
+                          </p:cTn>
+                        </p:par>
+                      </p:childTnLst>
+                    </p:cTn>
+                  </p:par>
+                  <p:par>
+                    <p:cTn id="12" fill="hold">
+                      <p:stCondLst>
+                        <p:cond delay="indefinite"/>
+                      </p:stCondLst>
+                      <p:childTnLst>
+                        <p:par>
+                          <p:cTn id="13" fill="hold">
+                            <p:stCondLst>
+                              <p:cond delay="0"/>
+                            </p:stCondLst>
+                            <p:childTnLst>
+                              <p:par>
+                                <p:cTn id="14" presetID="1" presetClass="entr" presetSubtype="0" fill="hold" nodeType="clickEffect">
+                                  <p:stCondLst>
+                                    <p:cond delay="0"/>
+                                  </p:stCondLst>
+                                  <p:childTnLst>
+                                    <p:set>
+                                      <p:cBhvr>
+                                        <p:cTn id="15" dur="1" fill="hold">
+                                          <p:stCondLst>
+                                            <p:cond delay="0"/>
+                                          </p:stCondLst>
+                                        </p:cTn>
+                                        <p:tgtEl>
+                                          <p:spTgt spid="3">
+                                            <p:txEl>
+                                              <p:pRg st="1" end="1"/>
+                                            </p:txEl>
+                                          </p:spTgt>
+                                        </p:tgtEl>
+                                        <p:attrNameLst>
+                                          <p:attrName>style.visibility</p:attrName>
+                                        </p:attrNameLst>
+                                      </p:cBhvr>
+                                      <p:to>
+                                        <p:strVal val="visible"/>
+                                      </p:to>
+                                    </p:set>
+                                  </p:childTnLst>
+                                </p:cTn>
+                              </p:par>
+                              <p:par>
+                                <p:cTn id="16" presetID="1" presetClass="entr" presetSubtype="0" fill="hold" nodeType="withEffect">
+                                  <p:stCondLst>
+                                    <p:cond delay="0"/>
+                                  </p:stCondLst>
+                                  <p:childTnLst>
+                                    <p:set>
+                                      <p:cBhvr>
+                                        <p:cTn id="17" dur="1" fill="hold">
+                                          <p:stCondLst>
+                                            <p:cond delay="0"/>
+                                          </p:stCondLst>
+                                        </p:cTn>
+                                        <p:tgtEl>
+                                          <p:spTgt spid="3">
+                                            <p:txEl>
+                                              <p:pRg st="2" end="2"/>
+                                            </p:txEl>
+                                          </p:spTgt>
+                                        </p:tgtEl>
+                                        <p:attrNameLst>
+                                          <p:attrName>style.visibility</p:attrName>
+                                        </p:attrNameLst>
+                                      </p:cBhvr>
+                                      <p:to>
+                                        <p:strVal val="visible"/>
+                                      </p:to>
+                                    </p:set>
+                                  </p:childTnLst>
+                                </p:cTn>
+                              </p:par>
+                            </p:childTnLst>
+                          </p:cTn>
+                        </p:par>
+                      </p:childTnLst>
+                    </p:cTn>
+                  </p:par>
+                  <p:par>
+                    <p:cTn id="18" fill="hold">
+                      <p:stCondLst>
+                        <p:cond delay="indefinite"/>
+                      </p:stCondLst>
+                      <p:childTnLst>
+                        <p:par>
+                          <p:cTn id="19" fill="hold">
+                            <p:stCondLst>
+                              <p:cond delay="0"/>
+                            </p:stCondLst>
+                            <p:childTnLst>
+                              <p:par>
+                                <p:cTn id="20" presetID="1" presetClass="entr" presetSubtype="0" fill="hold" nodeType="clickEffect">
+                                  <p:stCondLst>
+                                    <p:cond delay="0"/>
+                                  </p:stCondLst>
+                                  <p:childTnLst>
+                                    <p:set>
+                                      <p:cBhvr>
+                                        <p:cTn id="21" dur="1" fill="hold">
+                                          <p:stCondLst>
+                                            <p:cond delay="0"/>
+                                          </p:stCondLst>
+                                        </p:cTn>
+                                        <p:tgtEl>
+                                          <p:spTgt spid="3">
+                                            <p:txEl>
+                                              <p:pRg st="3" end="3"/>
+                                            </p:txEl>
+                                          </p:spTgt>
+                                        </p:tgtEl>
+                                        <p:attrNameLst>
+                                          <p:attrName>style.visibility</p:attrName>
+                                        </p:attrNameLst>
+                                      </p:cBhvr>
+                                      <p:to>
+                                        <p:strVal val="visible"/>
+                                      </p:to>
+                                    </p:set>
+                                  </p:childTnLst>
+                                </p:cTn>
+                              </p:par>
+                            </p:childTnLst>
+                          </p:cTn>
+                        </p:par>
+                      </p:childTnLst>
+                    </p:cTn>
+                  </p:par>
+                  <p:par>
+                    <p:cTn id="22" fill="hold">
+                      <p:stCondLst>
+                        <p:cond delay="indefinite"/>
+                      </p:stCondLst>
+                      <p:childTnLst>
+                        <p:par>
+                          <p:cTn id="23" fill="hold">
+                            <p:stCondLst>
+                              <p:cond delay="0"/>
+                            </p:stCondLst>
+                            <p:childTnLst>
+                              <p:par>
+                                <p:cTn id="24" presetID="1" presetClass="entr" presetSubtype="0" fill="hold" nodeType="clickEffect">
+                                  <p:stCondLst>
+                                    <p:cond delay="0"/>
+                                  </p:stCondLst>
+                                  <p:childTnLst>
+                                    <p:set>
+                                      <p:cBhvr>
+                                        <p:cTn id="25" dur="1" fill="hold">
+                                          <p:stCondLst>
+                                            <p:cond delay="0"/>
+                                          </p:stCondLst>
+                                        </p:cTn>
+                                        <p:tgtEl>
+                                          <p:spTgt spid="3">
+                                            <p:txEl>
+                                              <p:pRg st="4" end="4"/>
+                                            </p:txEl>
+                                          </p:spTgt>
+                                        </p:tgtEl>
+                                        <p:attrNameLst>
+                                          <p:attrName>style.visibility</p:attrName>
+                                        </p:attrNameLst>
+                                      </p:cBhvr>
+                                      <p:to>
+                                        <p:strVal val="visible"/>
+                                      </p:to>
+                                    </p:set>
+                                  </p:childTnLst>
+                                </p:cTn>
+                              </p:par>
+                            </p:childTnLst>
+                          </p:cTn>
+                        </p:par>
+                      </p:childTnLst>
+                    </p:cTn>
+                  </p:par>
+                </p:childTnLst>
+              </p:cTn>
+              <p:prevCondLst>
+                <p:cond evt="onPrev" delay="0">
+                  <p:tgtEl>
+                    <p:sldTgt/>
+                  </p:tgtEl>
+                </p:cond>
+              </p:prevCondLst>
+              <p:nextCondLst>
+                <p:cond evt="onNext" delay="0">
+                  <p:tgtEl>
+                    <p:sldTgt/>
+                  </p:tgtEl>
+                </p:cond>
+              </p:nextCondLst>
+            </p:seq>
+          </p:childTnLst>
+        </p:cTn>
+      </p:par>
+    </p:tnLst>
+  </p:timing>
+</p:sld>
+</file>
+
+<file path=ppt/slides/slide8.xml><?xml version="1.0" encoding="utf-8"?>
 <p:sld xmlns:a="http://schemas.openxmlformats.org/drawingml/2006/main" xmlns:r="http://schemas.openxmlformats.org/officeDocument/2006/relationships" xmlns:p="http://schemas.openxmlformats.org/presentationml/2006/main">
   <p:cSld>
     <p:spTree>

</xml_diff>